<commit_message>
Bizim motorun MMF dağılımı çıkarıldı. Alt-harmonik ve harmonikler gösterildi.
</commit_message>
<xml_diff>
--- a/Literature/immd_ver2_research.pptx
+++ b/Literature/immd_ver2_research.pptx
@@ -5,7 +5,7 @@
     <p:sldMasterId id="2147483660" r:id="rId1"/>
   </p:sldMasterIdLst>
   <p:notesMasterIdLst>
-    <p:notesMasterId r:id="rId61"/>
+    <p:notesMasterId r:id="rId68"/>
   </p:notesMasterIdLst>
   <p:sldIdLst>
     <p:sldId id="256" r:id="rId2"/>
@@ -67,6 +67,13 @@
     <p:sldId id="314" r:id="rId58"/>
     <p:sldId id="315" r:id="rId59"/>
     <p:sldId id="316" r:id="rId60"/>
+    <p:sldId id="317" r:id="rId61"/>
+    <p:sldId id="318" r:id="rId62"/>
+    <p:sldId id="319" r:id="rId63"/>
+    <p:sldId id="320" r:id="rId64"/>
+    <p:sldId id="321" r:id="rId65"/>
+    <p:sldId id="322" r:id="rId66"/>
+    <p:sldId id="323" r:id="rId67"/>
   </p:sldIdLst>
   <p:sldSz cx="9144000" cy="6858000" type="screen4x3"/>
   <p:notesSz cx="6858000" cy="9144000"/>
@@ -5059,6 +5066,90 @@
 </p:notes>
 </file>
 
+<file path=ppt/notesSlides/notesSlide59.xml><?xml version="1.0" encoding="utf-8"?>
+<p:notes xmlns:a="http://schemas.openxmlformats.org/drawingml/2006/main" xmlns:r="http://schemas.openxmlformats.org/officeDocument/2006/relationships" xmlns:p="http://schemas.openxmlformats.org/presentationml/2006/main">
+  <p:cSld>
+    <p:spTree>
+      <p:nvGrpSpPr>
+        <p:cNvPr id="1" name=""/>
+        <p:cNvGrpSpPr/>
+        <p:nvPr/>
+      </p:nvGrpSpPr>
+      <p:grpSpPr>
+        <a:xfrm>
+          <a:off x="0" y="0"/>
+          <a:ext cx="0" cy="0"/>
+          <a:chOff x="0" y="0"/>
+          <a:chExt cx="0" cy="0"/>
+        </a:xfrm>
+      </p:grpSpPr>
+      <p:sp>
+        <p:nvSpPr>
+          <p:cNvPr id="2" name="Slide Image Placeholder 1"/>
+          <p:cNvSpPr>
+            <a:spLocks noGrp="1" noRot="1" noChangeAspect="1"/>
+          </p:cNvSpPr>
+          <p:nvPr>
+            <p:ph type="sldImg"/>
+          </p:nvPr>
+        </p:nvSpPr>
+        <p:spPr/>
+      </p:sp>
+      <p:sp>
+        <p:nvSpPr>
+          <p:cNvPr id="3" name="Notes Placeholder 2"/>
+          <p:cNvSpPr>
+            <a:spLocks noGrp="1"/>
+          </p:cNvSpPr>
+          <p:nvPr>
+            <p:ph type="body" idx="1"/>
+          </p:nvPr>
+        </p:nvSpPr>
+        <p:spPr/>
+        <p:txBody>
+          <a:bodyPr/>
+          <a:lstStyle/>
+          <a:p>
+            <a:endParaRPr lang="en-US" dirty="0"/>
+          </a:p>
+        </p:txBody>
+      </p:sp>
+      <p:sp>
+        <p:nvSpPr>
+          <p:cNvPr id="4" name="Slide Number Placeholder 3"/>
+          <p:cNvSpPr>
+            <a:spLocks noGrp="1"/>
+          </p:cNvSpPr>
+          <p:nvPr>
+            <p:ph type="sldNum" sz="quarter" idx="10"/>
+          </p:nvPr>
+        </p:nvSpPr>
+        <p:spPr/>
+        <p:txBody>
+          <a:bodyPr/>
+          <a:lstStyle/>
+          <a:p>
+            <a:fld id="{035DD5C9-B5A2-47F1-BC40-0D7BD2C50D7F}" type="slidenum">
+              <a:rPr lang="en-US" smtClean="0"/>
+              <a:t>60</a:t>
+            </a:fld>
+            <a:endParaRPr lang="en-US"/>
+          </a:p>
+        </p:txBody>
+      </p:sp>
+    </p:spTree>
+    <p:extLst>
+      <p:ext uri="{BB962C8B-B14F-4D97-AF65-F5344CB8AC3E}">
+        <p14:creationId xmlns:p14="http://schemas.microsoft.com/office/powerpoint/2010/main" val="3201087151"/>
+      </p:ext>
+    </p:extLst>
+  </p:cSld>
+  <p:clrMapOvr>
+    <a:masterClrMapping/>
+  </p:clrMapOvr>
+</p:notes>
+</file>
+
 <file path=ppt/notesSlides/notesSlide6.xml><?xml version="1.0" encoding="utf-8"?>
 <p:notes xmlns:a="http://schemas.openxmlformats.org/drawingml/2006/main" xmlns:r="http://schemas.openxmlformats.org/officeDocument/2006/relationships" xmlns:p="http://schemas.openxmlformats.org/presentationml/2006/main">
   <p:cSld>
@@ -5134,6 +5225,510 @@
     <p:extLst>
       <p:ext uri="{BB962C8B-B14F-4D97-AF65-F5344CB8AC3E}">
         <p14:creationId xmlns:p14="http://schemas.microsoft.com/office/powerpoint/2010/main" val="559618118"/>
+      </p:ext>
+    </p:extLst>
+  </p:cSld>
+  <p:clrMapOvr>
+    <a:masterClrMapping/>
+  </p:clrMapOvr>
+</p:notes>
+</file>
+
+<file path=ppt/notesSlides/notesSlide60.xml><?xml version="1.0" encoding="utf-8"?>
+<p:notes xmlns:a="http://schemas.openxmlformats.org/drawingml/2006/main" xmlns:r="http://schemas.openxmlformats.org/officeDocument/2006/relationships" xmlns:p="http://schemas.openxmlformats.org/presentationml/2006/main">
+  <p:cSld>
+    <p:spTree>
+      <p:nvGrpSpPr>
+        <p:cNvPr id="1" name=""/>
+        <p:cNvGrpSpPr/>
+        <p:nvPr/>
+      </p:nvGrpSpPr>
+      <p:grpSpPr>
+        <a:xfrm>
+          <a:off x="0" y="0"/>
+          <a:ext cx="0" cy="0"/>
+          <a:chOff x="0" y="0"/>
+          <a:chExt cx="0" cy="0"/>
+        </a:xfrm>
+      </p:grpSpPr>
+      <p:sp>
+        <p:nvSpPr>
+          <p:cNvPr id="2" name="Slide Image Placeholder 1"/>
+          <p:cNvSpPr>
+            <a:spLocks noGrp="1" noRot="1" noChangeAspect="1"/>
+          </p:cNvSpPr>
+          <p:nvPr>
+            <p:ph type="sldImg"/>
+          </p:nvPr>
+        </p:nvSpPr>
+        <p:spPr/>
+      </p:sp>
+      <p:sp>
+        <p:nvSpPr>
+          <p:cNvPr id="3" name="Notes Placeholder 2"/>
+          <p:cNvSpPr>
+            <a:spLocks noGrp="1"/>
+          </p:cNvSpPr>
+          <p:nvPr>
+            <p:ph type="body" idx="1"/>
+          </p:nvPr>
+        </p:nvSpPr>
+        <p:spPr/>
+        <p:txBody>
+          <a:bodyPr/>
+          <a:lstStyle/>
+          <a:p>
+            <a:endParaRPr lang="en-US" dirty="0"/>
+          </a:p>
+        </p:txBody>
+      </p:sp>
+      <p:sp>
+        <p:nvSpPr>
+          <p:cNvPr id="4" name="Slide Number Placeholder 3"/>
+          <p:cNvSpPr>
+            <a:spLocks noGrp="1"/>
+          </p:cNvSpPr>
+          <p:nvPr>
+            <p:ph type="sldNum" sz="quarter" idx="10"/>
+          </p:nvPr>
+        </p:nvSpPr>
+        <p:spPr/>
+        <p:txBody>
+          <a:bodyPr/>
+          <a:lstStyle/>
+          <a:p>
+            <a:fld id="{035DD5C9-B5A2-47F1-BC40-0D7BD2C50D7F}" type="slidenum">
+              <a:rPr lang="en-US" smtClean="0"/>
+              <a:t>61</a:t>
+            </a:fld>
+            <a:endParaRPr lang="en-US"/>
+          </a:p>
+        </p:txBody>
+      </p:sp>
+    </p:spTree>
+    <p:extLst>
+      <p:ext uri="{BB962C8B-B14F-4D97-AF65-F5344CB8AC3E}">
+        <p14:creationId xmlns:p14="http://schemas.microsoft.com/office/powerpoint/2010/main" val="2565574903"/>
+      </p:ext>
+    </p:extLst>
+  </p:cSld>
+  <p:clrMapOvr>
+    <a:masterClrMapping/>
+  </p:clrMapOvr>
+</p:notes>
+</file>
+
+<file path=ppt/notesSlides/notesSlide61.xml><?xml version="1.0" encoding="utf-8"?>
+<p:notes xmlns:a="http://schemas.openxmlformats.org/drawingml/2006/main" xmlns:r="http://schemas.openxmlformats.org/officeDocument/2006/relationships" xmlns:p="http://schemas.openxmlformats.org/presentationml/2006/main">
+  <p:cSld>
+    <p:spTree>
+      <p:nvGrpSpPr>
+        <p:cNvPr id="1" name=""/>
+        <p:cNvGrpSpPr/>
+        <p:nvPr/>
+      </p:nvGrpSpPr>
+      <p:grpSpPr>
+        <a:xfrm>
+          <a:off x="0" y="0"/>
+          <a:ext cx="0" cy="0"/>
+          <a:chOff x="0" y="0"/>
+          <a:chExt cx="0" cy="0"/>
+        </a:xfrm>
+      </p:grpSpPr>
+      <p:sp>
+        <p:nvSpPr>
+          <p:cNvPr id="2" name="Slide Image Placeholder 1"/>
+          <p:cNvSpPr>
+            <a:spLocks noGrp="1" noRot="1" noChangeAspect="1"/>
+          </p:cNvSpPr>
+          <p:nvPr>
+            <p:ph type="sldImg"/>
+          </p:nvPr>
+        </p:nvSpPr>
+        <p:spPr/>
+      </p:sp>
+      <p:sp>
+        <p:nvSpPr>
+          <p:cNvPr id="3" name="Notes Placeholder 2"/>
+          <p:cNvSpPr>
+            <a:spLocks noGrp="1"/>
+          </p:cNvSpPr>
+          <p:nvPr>
+            <p:ph type="body" idx="1"/>
+          </p:nvPr>
+        </p:nvSpPr>
+        <p:spPr/>
+        <p:txBody>
+          <a:bodyPr/>
+          <a:lstStyle/>
+          <a:p>
+            <a:endParaRPr lang="en-US" dirty="0"/>
+          </a:p>
+        </p:txBody>
+      </p:sp>
+      <p:sp>
+        <p:nvSpPr>
+          <p:cNvPr id="4" name="Slide Number Placeholder 3"/>
+          <p:cNvSpPr>
+            <a:spLocks noGrp="1"/>
+          </p:cNvSpPr>
+          <p:nvPr>
+            <p:ph type="sldNum" sz="quarter" idx="10"/>
+          </p:nvPr>
+        </p:nvSpPr>
+        <p:spPr/>
+        <p:txBody>
+          <a:bodyPr/>
+          <a:lstStyle/>
+          <a:p>
+            <a:fld id="{035DD5C9-B5A2-47F1-BC40-0D7BD2C50D7F}" type="slidenum">
+              <a:rPr lang="en-US" smtClean="0"/>
+              <a:t>62</a:t>
+            </a:fld>
+            <a:endParaRPr lang="en-US"/>
+          </a:p>
+        </p:txBody>
+      </p:sp>
+    </p:spTree>
+    <p:extLst>
+      <p:ext uri="{BB962C8B-B14F-4D97-AF65-F5344CB8AC3E}">
+        <p14:creationId xmlns:p14="http://schemas.microsoft.com/office/powerpoint/2010/main" val="2309792232"/>
+      </p:ext>
+    </p:extLst>
+  </p:cSld>
+  <p:clrMapOvr>
+    <a:masterClrMapping/>
+  </p:clrMapOvr>
+</p:notes>
+</file>
+
+<file path=ppt/notesSlides/notesSlide62.xml><?xml version="1.0" encoding="utf-8"?>
+<p:notes xmlns:a="http://schemas.openxmlformats.org/drawingml/2006/main" xmlns:r="http://schemas.openxmlformats.org/officeDocument/2006/relationships" xmlns:p="http://schemas.openxmlformats.org/presentationml/2006/main">
+  <p:cSld>
+    <p:spTree>
+      <p:nvGrpSpPr>
+        <p:cNvPr id="1" name=""/>
+        <p:cNvGrpSpPr/>
+        <p:nvPr/>
+      </p:nvGrpSpPr>
+      <p:grpSpPr>
+        <a:xfrm>
+          <a:off x="0" y="0"/>
+          <a:ext cx="0" cy="0"/>
+          <a:chOff x="0" y="0"/>
+          <a:chExt cx="0" cy="0"/>
+        </a:xfrm>
+      </p:grpSpPr>
+      <p:sp>
+        <p:nvSpPr>
+          <p:cNvPr id="2" name="Slide Image Placeholder 1"/>
+          <p:cNvSpPr>
+            <a:spLocks noGrp="1" noRot="1" noChangeAspect="1"/>
+          </p:cNvSpPr>
+          <p:nvPr>
+            <p:ph type="sldImg"/>
+          </p:nvPr>
+        </p:nvSpPr>
+        <p:spPr/>
+      </p:sp>
+      <p:sp>
+        <p:nvSpPr>
+          <p:cNvPr id="3" name="Notes Placeholder 2"/>
+          <p:cNvSpPr>
+            <a:spLocks noGrp="1"/>
+          </p:cNvSpPr>
+          <p:nvPr>
+            <p:ph type="body" idx="1"/>
+          </p:nvPr>
+        </p:nvSpPr>
+        <p:spPr/>
+        <p:txBody>
+          <a:bodyPr/>
+          <a:lstStyle/>
+          <a:p>
+            <a:endParaRPr lang="en-US" dirty="0"/>
+          </a:p>
+        </p:txBody>
+      </p:sp>
+      <p:sp>
+        <p:nvSpPr>
+          <p:cNvPr id="4" name="Slide Number Placeholder 3"/>
+          <p:cNvSpPr>
+            <a:spLocks noGrp="1"/>
+          </p:cNvSpPr>
+          <p:nvPr>
+            <p:ph type="sldNum" sz="quarter" idx="10"/>
+          </p:nvPr>
+        </p:nvSpPr>
+        <p:spPr/>
+        <p:txBody>
+          <a:bodyPr/>
+          <a:lstStyle/>
+          <a:p>
+            <a:fld id="{035DD5C9-B5A2-47F1-BC40-0D7BD2C50D7F}" type="slidenum">
+              <a:rPr lang="en-US" smtClean="0"/>
+              <a:t>63</a:t>
+            </a:fld>
+            <a:endParaRPr lang="en-US"/>
+          </a:p>
+        </p:txBody>
+      </p:sp>
+    </p:spTree>
+    <p:extLst>
+      <p:ext uri="{BB962C8B-B14F-4D97-AF65-F5344CB8AC3E}">
+        <p14:creationId xmlns:p14="http://schemas.microsoft.com/office/powerpoint/2010/main" val="4196291063"/>
+      </p:ext>
+    </p:extLst>
+  </p:cSld>
+  <p:clrMapOvr>
+    <a:masterClrMapping/>
+  </p:clrMapOvr>
+</p:notes>
+</file>
+
+<file path=ppt/notesSlides/notesSlide63.xml><?xml version="1.0" encoding="utf-8"?>
+<p:notes xmlns:a="http://schemas.openxmlformats.org/drawingml/2006/main" xmlns:r="http://schemas.openxmlformats.org/officeDocument/2006/relationships" xmlns:p="http://schemas.openxmlformats.org/presentationml/2006/main">
+  <p:cSld>
+    <p:spTree>
+      <p:nvGrpSpPr>
+        <p:cNvPr id="1" name=""/>
+        <p:cNvGrpSpPr/>
+        <p:nvPr/>
+      </p:nvGrpSpPr>
+      <p:grpSpPr>
+        <a:xfrm>
+          <a:off x="0" y="0"/>
+          <a:ext cx="0" cy="0"/>
+          <a:chOff x="0" y="0"/>
+          <a:chExt cx="0" cy="0"/>
+        </a:xfrm>
+      </p:grpSpPr>
+      <p:sp>
+        <p:nvSpPr>
+          <p:cNvPr id="2" name="Slide Image Placeholder 1"/>
+          <p:cNvSpPr>
+            <a:spLocks noGrp="1" noRot="1" noChangeAspect="1"/>
+          </p:cNvSpPr>
+          <p:nvPr>
+            <p:ph type="sldImg"/>
+          </p:nvPr>
+        </p:nvSpPr>
+        <p:spPr/>
+      </p:sp>
+      <p:sp>
+        <p:nvSpPr>
+          <p:cNvPr id="3" name="Notes Placeholder 2"/>
+          <p:cNvSpPr>
+            <a:spLocks noGrp="1"/>
+          </p:cNvSpPr>
+          <p:nvPr>
+            <p:ph type="body" idx="1"/>
+          </p:nvPr>
+        </p:nvSpPr>
+        <p:spPr/>
+        <p:txBody>
+          <a:bodyPr/>
+          <a:lstStyle/>
+          <a:p>
+            <a:endParaRPr lang="en-US" dirty="0"/>
+          </a:p>
+        </p:txBody>
+      </p:sp>
+      <p:sp>
+        <p:nvSpPr>
+          <p:cNvPr id="4" name="Slide Number Placeholder 3"/>
+          <p:cNvSpPr>
+            <a:spLocks noGrp="1"/>
+          </p:cNvSpPr>
+          <p:nvPr>
+            <p:ph type="sldNum" sz="quarter" idx="10"/>
+          </p:nvPr>
+        </p:nvSpPr>
+        <p:spPr/>
+        <p:txBody>
+          <a:bodyPr/>
+          <a:lstStyle/>
+          <a:p>
+            <a:fld id="{035DD5C9-B5A2-47F1-BC40-0D7BD2C50D7F}" type="slidenum">
+              <a:rPr lang="en-US" smtClean="0"/>
+              <a:t>64</a:t>
+            </a:fld>
+            <a:endParaRPr lang="en-US"/>
+          </a:p>
+        </p:txBody>
+      </p:sp>
+    </p:spTree>
+    <p:extLst>
+      <p:ext uri="{BB962C8B-B14F-4D97-AF65-F5344CB8AC3E}">
+        <p14:creationId xmlns:p14="http://schemas.microsoft.com/office/powerpoint/2010/main" val="1644590473"/>
+      </p:ext>
+    </p:extLst>
+  </p:cSld>
+  <p:clrMapOvr>
+    <a:masterClrMapping/>
+  </p:clrMapOvr>
+</p:notes>
+</file>
+
+<file path=ppt/notesSlides/notesSlide64.xml><?xml version="1.0" encoding="utf-8"?>
+<p:notes xmlns:a="http://schemas.openxmlformats.org/drawingml/2006/main" xmlns:r="http://schemas.openxmlformats.org/officeDocument/2006/relationships" xmlns:p="http://schemas.openxmlformats.org/presentationml/2006/main">
+  <p:cSld>
+    <p:spTree>
+      <p:nvGrpSpPr>
+        <p:cNvPr id="1" name=""/>
+        <p:cNvGrpSpPr/>
+        <p:nvPr/>
+      </p:nvGrpSpPr>
+      <p:grpSpPr>
+        <a:xfrm>
+          <a:off x="0" y="0"/>
+          <a:ext cx="0" cy="0"/>
+          <a:chOff x="0" y="0"/>
+          <a:chExt cx="0" cy="0"/>
+        </a:xfrm>
+      </p:grpSpPr>
+      <p:sp>
+        <p:nvSpPr>
+          <p:cNvPr id="2" name="Slide Image Placeholder 1"/>
+          <p:cNvSpPr>
+            <a:spLocks noGrp="1" noRot="1" noChangeAspect="1"/>
+          </p:cNvSpPr>
+          <p:nvPr>
+            <p:ph type="sldImg"/>
+          </p:nvPr>
+        </p:nvSpPr>
+        <p:spPr/>
+      </p:sp>
+      <p:sp>
+        <p:nvSpPr>
+          <p:cNvPr id="3" name="Notes Placeholder 2"/>
+          <p:cNvSpPr>
+            <a:spLocks noGrp="1"/>
+          </p:cNvSpPr>
+          <p:nvPr>
+            <p:ph type="body" idx="1"/>
+          </p:nvPr>
+        </p:nvSpPr>
+        <p:spPr/>
+        <p:txBody>
+          <a:bodyPr/>
+          <a:lstStyle/>
+          <a:p>
+            <a:endParaRPr lang="en-US" dirty="0"/>
+          </a:p>
+        </p:txBody>
+      </p:sp>
+      <p:sp>
+        <p:nvSpPr>
+          <p:cNvPr id="4" name="Slide Number Placeholder 3"/>
+          <p:cNvSpPr>
+            <a:spLocks noGrp="1"/>
+          </p:cNvSpPr>
+          <p:nvPr>
+            <p:ph type="sldNum" sz="quarter" idx="10"/>
+          </p:nvPr>
+        </p:nvSpPr>
+        <p:spPr/>
+        <p:txBody>
+          <a:bodyPr/>
+          <a:lstStyle/>
+          <a:p>
+            <a:fld id="{035DD5C9-B5A2-47F1-BC40-0D7BD2C50D7F}" type="slidenum">
+              <a:rPr lang="en-US" smtClean="0"/>
+              <a:t>65</a:t>
+            </a:fld>
+            <a:endParaRPr lang="en-US"/>
+          </a:p>
+        </p:txBody>
+      </p:sp>
+    </p:spTree>
+    <p:extLst>
+      <p:ext uri="{BB962C8B-B14F-4D97-AF65-F5344CB8AC3E}">
+        <p14:creationId xmlns:p14="http://schemas.microsoft.com/office/powerpoint/2010/main" val="1808882771"/>
+      </p:ext>
+    </p:extLst>
+  </p:cSld>
+  <p:clrMapOvr>
+    <a:masterClrMapping/>
+  </p:clrMapOvr>
+</p:notes>
+</file>
+
+<file path=ppt/notesSlides/notesSlide65.xml><?xml version="1.0" encoding="utf-8"?>
+<p:notes xmlns:a="http://schemas.openxmlformats.org/drawingml/2006/main" xmlns:r="http://schemas.openxmlformats.org/officeDocument/2006/relationships" xmlns:p="http://schemas.openxmlformats.org/presentationml/2006/main">
+  <p:cSld>
+    <p:spTree>
+      <p:nvGrpSpPr>
+        <p:cNvPr id="1" name=""/>
+        <p:cNvGrpSpPr/>
+        <p:nvPr/>
+      </p:nvGrpSpPr>
+      <p:grpSpPr>
+        <a:xfrm>
+          <a:off x="0" y="0"/>
+          <a:ext cx="0" cy="0"/>
+          <a:chOff x="0" y="0"/>
+          <a:chExt cx="0" cy="0"/>
+        </a:xfrm>
+      </p:grpSpPr>
+      <p:sp>
+        <p:nvSpPr>
+          <p:cNvPr id="2" name="Slide Image Placeholder 1"/>
+          <p:cNvSpPr>
+            <a:spLocks noGrp="1" noRot="1" noChangeAspect="1"/>
+          </p:cNvSpPr>
+          <p:nvPr>
+            <p:ph type="sldImg"/>
+          </p:nvPr>
+        </p:nvSpPr>
+        <p:spPr/>
+      </p:sp>
+      <p:sp>
+        <p:nvSpPr>
+          <p:cNvPr id="3" name="Notes Placeholder 2"/>
+          <p:cNvSpPr>
+            <a:spLocks noGrp="1"/>
+          </p:cNvSpPr>
+          <p:nvPr>
+            <p:ph type="body" idx="1"/>
+          </p:nvPr>
+        </p:nvSpPr>
+        <p:spPr/>
+        <p:txBody>
+          <a:bodyPr/>
+          <a:lstStyle/>
+          <a:p>
+            <a:endParaRPr lang="en-US" dirty="0"/>
+          </a:p>
+        </p:txBody>
+      </p:sp>
+      <p:sp>
+        <p:nvSpPr>
+          <p:cNvPr id="4" name="Slide Number Placeholder 3"/>
+          <p:cNvSpPr>
+            <a:spLocks noGrp="1"/>
+          </p:cNvSpPr>
+          <p:nvPr>
+            <p:ph type="sldNum" sz="quarter" idx="10"/>
+          </p:nvPr>
+        </p:nvSpPr>
+        <p:spPr/>
+        <p:txBody>
+          <a:bodyPr/>
+          <a:lstStyle/>
+          <a:p>
+            <a:fld id="{035DD5C9-B5A2-47F1-BC40-0D7BD2C50D7F}" type="slidenum">
+              <a:rPr lang="en-US" smtClean="0"/>
+              <a:t>66</a:t>
+            </a:fld>
+            <a:endParaRPr lang="en-US"/>
+          </a:p>
+        </p:txBody>
+      </p:sp>
+    </p:spTree>
+    <p:extLst>
+      <p:ext uri="{BB962C8B-B14F-4D97-AF65-F5344CB8AC3E}">
+        <p14:creationId xmlns:p14="http://schemas.microsoft.com/office/powerpoint/2010/main" val="256221846"/>
       </p:ext>
     </p:extLst>
   </p:cSld>
@@ -34461,8 +35056,50 @@
                 </a:solidFill>
                 <a:cs typeface="Arial" panose="020B0604020202020204" pitchFamily="34" charset="0"/>
               </a:rPr>
-              <a:t>armature reaction.</a:t>
-            </a:r>
+              <a:t>armature </a:t>
+            </a:r>
+            <a:r>
+              <a:rPr lang="en-US" sz="2000" dirty="0" smtClean="0">
+                <a:solidFill>
+                  <a:srgbClr val="C00000"/>
+                </a:solidFill>
+                <a:cs typeface="Arial" panose="020B0604020202020204" pitchFamily="34" charset="0"/>
+              </a:rPr>
+              <a:t>reaction</a:t>
+            </a:r>
+            <a:r>
+              <a:rPr lang="tr-TR" sz="2000" dirty="0" smtClean="0">
+                <a:solidFill>
+                  <a:srgbClr val="C00000"/>
+                </a:solidFill>
+                <a:cs typeface="Arial" panose="020B0604020202020204" pitchFamily="34" charset="0"/>
+              </a:rPr>
+              <a:t> (MMF </a:t>
+            </a:r>
+            <a:r>
+              <a:rPr lang="tr-TR" sz="2000" dirty="0" err="1" smtClean="0">
+                <a:solidFill>
+                  <a:srgbClr val="C00000"/>
+                </a:solidFill>
+                <a:cs typeface="Arial" panose="020B0604020202020204" pitchFamily="34" charset="0"/>
+              </a:rPr>
+              <a:t>sub-harmonic</a:t>
+            </a:r>
+            <a:r>
+              <a:rPr lang="tr-TR" sz="2000" dirty="0" smtClean="0">
+                <a:solidFill>
+                  <a:srgbClr val="C00000"/>
+                </a:solidFill>
+                <a:cs typeface="Arial" panose="020B0604020202020204" pitchFamily="34" charset="0"/>
+              </a:rPr>
+              <a:t> ile alakalı bu da)</a:t>
+            </a:r>
+            <a:endParaRPr lang="en-US" sz="2000" dirty="0">
+              <a:solidFill>
+                <a:srgbClr val="C00000"/>
+              </a:solidFill>
+              <a:cs typeface="Arial" panose="020B0604020202020204" pitchFamily="34" charset="0"/>
+            </a:endParaRPr>
           </a:p>
           <a:p>
             <a:pPr marL="285750" indent="-285750">
@@ -36487,7 +37124,7 @@
         <p:spPr>
           <a:xfrm>
             <a:off x="333702" y="1197109"/>
-            <a:ext cx="8810298" cy="2031325"/>
+            <a:ext cx="8810298" cy="3970318"/>
           </a:xfrm>
           <a:prstGeom prst="rect">
             <a:avLst/>
@@ -36559,7 +37196,23 @@
                   <a:srgbClr val="002060"/>
                 </a:solidFill>
               </a:rPr>
-              <a:t>existence of flux pulsations due to the stator </a:t>
+              <a:t>existence of </a:t>
+            </a:r>
+            <a:r>
+              <a:rPr lang="en-US" dirty="0">
+                <a:solidFill>
+                  <a:srgbClr val="FF0000"/>
+                </a:solidFill>
+              </a:rPr>
+              <a:t>flux pulsations </a:t>
+            </a:r>
+            <a:r>
+              <a:rPr lang="en-US" dirty="0">
+                <a:solidFill>
+                  <a:srgbClr val="002060"/>
+                </a:solidFill>
+              </a:rPr>
+              <a:t>due to the stator </a:t>
             </a:r>
             <a:r>
               <a:rPr lang="en-US" dirty="0" smtClean="0">
@@ -36594,19 +37247,27 @@
                   <a:srgbClr val="002060"/>
                 </a:solidFill>
               </a:rPr>
-              <a:t>presence of air-gap MMF </a:t>
+              <a:t>presence of air-gap </a:t>
+            </a:r>
+            <a:r>
+              <a:rPr lang="en-US" dirty="0">
+                <a:solidFill>
+                  <a:srgbClr val="FF0000"/>
+                </a:solidFill>
+              </a:rPr>
+              <a:t>MMF </a:t>
             </a:r>
             <a:r>
               <a:rPr lang="en-US" dirty="0" smtClean="0">
                 <a:solidFill>
-                  <a:srgbClr val="002060"/>
+                  <a:srgbClr val="FF0000"/>
                 </a:solidFill>
               </a:rPr>
               <a:t>harmonics</a:t>
             </a:r>
             <a:endParaRPr lang="tr-TR" dirty="0" smtClean="0">
               <a:solidFill>
-                <a:srgbClr val="002060"/>
+                <a:srgbClr val="FF0000"/>
               </a:solidFill>
             </a:endParaRPr>
           </a:p>
@@ -36702,11 +37363,232 @@
               </a:rPr>
               <a:t>.</a:t>
             </a:r>
-            <a:endParaRPr lang="en-US" dirty="0">
+          </a:p>
+          <a:p>
+            <a:endParaRPr lang="tr-TR" dirty="0" smtClean="0">
               <a:solidFill>
                 <a:srgbClr val="002060"/>
               </a:solidFill>
             </a:endParaRPr>
+          </a:p>
+          <a:p>
+            <a:endParaRPr lang="tr-TR" dirty="0">
+              <a:solidFill>
+                <a:srgbClr val="002060"/>
+              </a:solidFill>
+            </a:endParaRPr>
+          </a:p>
+          <a:p>
+            <a:r>
+              <a:rPr lang="tr-TR" b="1" dirty="0" err="1" smtClean="0">
+                <a:solidFill>
+                  <a:srgbClr val="002060"/>
+                </a:solidFill>
+              </a:rPr>
+              <a:t>Techniques</a:t>
+            </a:r>
+            <a:r>
+              <a:rPr lang="tr-TR" b="1" dirty="0" smtClean="0">
+                <a:solidFill>
+                  <a:srgbClr val="002060"/>
+                </a:solidFill>
+              </a:rPr>
+              <a:t> </a:t>
+            </a:r>
+            <a:r>
+              <a:rPr lang="tr-TR" b="1" dirty="0" err="1" smtClean="0">
+                <a:solidFill>
+                  <a:srgbClr val="002060"/>
+                </a:solidFill>
+              </a:rPr>
+              <a:t>to</a:t>
+            </a:r>
+            <a:r>
+              <a:rPr lang="tr-TR" b="1" dirty="0" smtClean="0">
+                <a:solidFill>
+                  <a:srgbClr val="002060"/>
+                </a:solidFill>
+              </a:rPr>
+              <a:t> </a:t>
+            </a:r>
+            <a:r>
+              <a:rPr lang="tr-TR" b="1" dirty="0" err="1" smtClean="0">
+                <a:solidFill>
+                  <a:srgbClr val="002060"/>
+                </a:solidFill>
+              </a:rPr>
+              <a:t>reduce</a:t>
+            </a:r>
+            <a:r>
+              <a:rPr lang="tr-TR" b="1" dirty="0" smtClean="0">
+                <a:solidFill>
+                  <a:srgbClr val="002060"/>
+                </a:solidFill>
+              </a:rPr>
+              <a:t> rotor </a:t>
+            </a:r>
+            <a:r>
+              <a:rPr lang="tr-TR" b="1" dirty="0" err="1" smtClean="0">
+                <a:solidFill>
+                  <a:srgbClr val="002060"/>
+                </a:solidFill>
+              </a:rPr>
+              <a:t>losses</a:t>
+            </a:r>
+            <a:r>
+              <a:rPr lang="tr-TR" b="1" dirty="0" smtClean="0">
+                <a:solidFill>
+                  <a:srgbClr val="002060"/>
+                </a:solidFill>
+              </a:rPr>
+              <a:t>:</a:t>
+            </a:r>
+          </a:p>
+          <a:p>
+            <a:pPr marL="285750" indent="-285750">
+              <a:buFont typeface="Arial" panose="020B0604020202020204" pitchFamily="34" charset="0"/>
+              <a:buChar char="•"/>
+            </a:pPr>
+            <a:r>
+              <a:rPr lang="tr-TR" dirty="0" err="1" smtClean="0">
+                <a:solidFill>
+                  <a:srgbClr val="002060"/>
+                </a:solidFill>
+              </a:rPr>
+              <a:t>Laminated</a:t>
+            </a:r>
+            <a:r>
+              <a:rPr lang="tr-TR" dirty="0" smtClean="0">
+                <a:solidFill>
+                  <a:srgbClr val="002060"/>
+                </a:solidFill>
+              </a:rPr>
+              <a:t> rotor</a:t>
+            </a:r>
+          </a:p>
+          <a:p>
+            <a:pPr marL="285750" indent="-285750">
+              <a:buFont typeface="Arial" panose="020B0604020202020204" pitchFamily="34" charset="0"/>
+              <a:buChar char="•"/>
+            </a:pPr>
+            <a:r>
+              <a:rPr lang="en-US" dirty="0">
+                <a:solidFill>
+                  <a:srgbClr val="002060"/>
+                </a:solidFill>
+              </a:rPr>
+              <a:t>Axial and/or circumferential segmentation of the </a:t>
+            </a:r>
+            <a:r>
+              <a:rPr lang="en-US" dirty="0" smtClean="0">
+                <a:solidFill>
+                  <a:srgbClr val="002060"/>
+                </a:solidFill>
+              </a:rPr>
+              <a:t>permanent-magnets</a:t>
+            </a:r>
+            <a:r>
+              <a:rPr lang="tr-TR" dirty="0" smtClean="0">
+                <a:solidFill>
+                  <a:srgbClr val="002060"/>
+                </a:solidFill>
+              </a:rPr>
+              <a:t> </a:t>
+            </a:r>
+            <a:r>
+              <a:rPr lang="tr-TR" dirty="0">
+                <a:solidFill>
+                  <a:srgbClr val="FF0000"/>
+                </a:solidFill>
+              </a:rPr>
+              <a:t>???</a:t>
+            </a:r>
+            <a:endParaRPr lang="tr-TR" dirty="0" smtClean="0">
+              <a:solidFill>
+                <a:srgbClr val="002060"/>
+              </a:solidFill>
+            </a:endParaRPr>
+          </a:p>
+          <a:p>
+            <a:pPr marL="285750" indent="-285750">
+              <a:buFont typeface="Arial" panose="020B0604020202020204" pitchFamily="34" charset="0"/>
+              <a:buChar char="•"/>
+            </a:pPr>
+            <a:r>
+              <a:rPr lang="en-US" dirty="0" smtClean="0">
+                <a:solidFill>
+                  <a:srgbClr val="002060"/>
+                </a:solidFill>
+              </a:rPr>
+              <a:t>Use </a:t>
+            </a:r>
+            <a:r>
+              <a:rPr lang="en-US" dirty="0">
+                <a:solidFill>
+                  <a:srgbClr val="002060"/>
+                </a:solidFill>
+              </a:rPr>
+              <a:t>of a higher resistivity PM material (e.g. bonded vs sintered</a:t>
+            </a:r>
+            <a:r>
+              <a:rPr lang="en-US" dirty="0" smtClean="0">
+                <a:solidFill>
+                  <a:srgbClr val="002060"/>
+                </a:solidFill>
+              </a:rPr>
+              <a:t>)</a:t>
+            </a:r>
+            <a:endParaRPr lang="tr-TR" dirty="0" smtClean="0">
+              <a:solidFill>
+                <a:srgbClr val="002060"/>
+              </a:solidFill>
+            </a:endParaRPr>
+          </a:p>
+          <a:p>
+            <a:pPr marL="285750" indent="-285750">
+              <a:buFont typeface="Arial" panose="020B0604020202020204" pitchFamily="34" charset="0"/>
+              <a:buChar char="•"/>
+            </a:pPr>
+            <a:r>
+              <a:rPr lang="en-US" dirty="0" smtClean="0">
+                <a:solidFill>
+                  <a:srgbClr val="002060"/>
+                </a:solidFill>
+              </a:rPr>
+              <a:t>Shielding </a:t>
+            </a:r>
+            <a:r>
+              <a:rPr lang="en-US" dirty="0">
+                <a:solidFill>
+                  <a:srgbClr val="002060"/>
+                </a:solidFill>
+              </a:rPr>
+              <a:t>by copper </a:t>
+            </a:r>
+            <a:r>
+              <a:rPr lang="en-US" dirty="0" smtClean="0">
+                <a:solidFill>
+                  <a:srgbClr val="002060"/>
+                </a:solidFill>
+              </a:rPr>
+              <a:t>cladding</a:t>
+            </a:r>
+            <a:r>
+              <a:rPr lang="tr-TR" dirty="0" smtClean="0">
+                <a:solidFill>
+                  <a:srgbClr val="002060"/>
+                </a:solidFill>
+              </a:rPr>
+              <a:t> </a:t>
+            </a:r>
+            <a:r>
+              <a:rPr lang="tr-TR" dirty="0" smtClean="0">
+                <a:solidFill>
+                  <a:srgbClr val="FF0000"/>
+                </a:solidFill>
+              </a:rPr>
+              <a:t>???</a:t>
+            </a:r>
           </a:p>
         </p:txBody>
       </p:sp>
@@ -37423,6 +38305,3592 @@
     <p:extLst>
       <p:ext uri="{BB962C8B-B14F-4D97-AF65-F5344CB8AC3E}">
         <p14:creationId xmlns:p14="http://schemas.microsoft.com/office/powerpoint/2010/main" val="2063063816"/>
+      </p:ext>
+    </p:extLst>
+  </p:cSld>
+  <p:clrMapOvr>
+    <a:masterClrMapping/>
+  </p:clrMapOvr>
+  <p:timing>
+    <p:tnLst>
+      <p:par>
+        <p:cTn id="1" dur="indefinite" restart="never" nodeType="tmRoot"/>
+      </p:par>
+    </p:tnLst>
+  </p:timing>
+</p:sld>
+</file>
+
+<file path=ppt/slides/slide60.xml><?xml version="1.0" encoding="utf-8"?>
+<p:sld xmlns:a="http://schemas.openxmlformats.org/drawingml/2006/main" xmlns:r="http://schemas.openxmlformats.org/officeDocument/2006/relationships" xmlns:p="http://schemas.openxmlformats.org/presentationml/2006/main">
+  <p:cSld>
+    <p:spTree>
+      <p:nvGrpSpPr>
+        <p:cNvPr id="1" name=""/>
+        <p:cNvGrpSpPr/>
+        <p:nvPr/>
+      </p:nvGrpSpPr>
+      <p:grpSpPr>
+        <a:xfrm>
+          <a:off x="0" y="0"/>
+          <a:ext cx="0" cy="0"/>
+          <a:chOff x="0" y="0"/>
+          <a:chExt cx="0" cy="0"/>
+        </a:xfrm>
+      </p:grpSpPr>
+      <p:sp>
+        <p:nvSpPr>
+          <p:cNvPr id="8" name="Rectangle 7"/>
+          <p:cNvSpPr/>
+          <p:nvPr/>
+        </p:nvSpPr>
+        <p:spPr>
+          <a:xfrm>
+            <a:off x="478970" y="150669"/>
+            <a:ext cx="8207829" cy="523220"/>
+          </a:xfrm>
+          <a:prstGeom prst="rect">
+            <a:avLst/>
+          </a:prstGeom>
+        </p:spPr>
+        <p:txBody>
+          <a:bodyPr wrap="square">
+            <a:spAutoFit/>
+          </a:bodyPr>
+          <a:lstStyle/>
+          <a:p>
+            <a:pPr algn="ctr"/>
+            <a:r>
+              <a:rPr lang="tr-TR" sz="2800" b="1" dirty="0" err="1" smtClean="0">
+                <a:solidFill>
+                  <a:schemeClr val="accent1">
+                    <a:lumMod val="50000"/>
+                  </a:schemeClr>
+                </a:solidFill>
+                <a:cs typeface="Arial" panose="020B0604020202020204" pitchFamily="34" charset="0"/>
+              </a:rPr>
+              <a:t>Fractional</a:t>
+            </a:r>
+            <a:r>
+              <a:rPr lang="tr-TR" sz="2800" b="1" dirty="0" smtClean="0">
+                <a:solidFill>
+                  <a:schemeClr val="accent1">
+                    <a:lumMod val="50000"/>
+                  </a:schemeClr>
+                </a:solidFill>
+                <a:cs typeface="Arial" panose="020B0604020202020204" pitchFamily="34" charset="0"/>
+              </a:rPr>
+              <a:t> </a:t>
+            </a:r>
+            <a:r>
+              <a:rPr lang="tr-TR" sz="2800" b="1" dirty="0" err="1" smtClean="0">
+                <a:solidFill>
+                  <a:schemeClr val="accent1">
+                    <a:lumMod val="50000"/>
+                  </a:schemeClr>
+                </a:solidFill>
+                <a:cs typeface="Arial" panose="020B0604020202020204" pitchFamily="34" charset="0"/>
+              </a:rPr>
+              <a:t>Slot</a:t>
+            </a:r>
+            <a:r>
+              <a:rPr lang="tr-TR" sz="2800" b="1" dirty="0" smtClean="0">
+                <a:solidFill>
+                  <a:schemeClr val="accent1">
+                    <a:lumMod val="50000"/>
+                  </a:schemeClr>
+                </a:solidFill>
+                <a:cs typeface="Arial" panose="020B0604020202020204" pitchFamily="34" charset="0"/>
+              </a:rPr>
+              <a:t> </a:t>
+            </a:r>
+            <a:r>
+              <a:rPr lang="tr-TR" sz="2800" b="1" dirty="0" err="1" smtClean="0">
+                <a:solidFill>
+                  <a:schemeClr val="accent1">
+                    <a:lumMod val="50000"/>
+                  </a:schemeClr>
+                </a:solidFill>
+                <a:cs typeface="Arial" panose="020B0604020202020204" pitchFamily="34" charset="0"/>
+              </a:rPr>
+              <a:t>Concentrated</a:t>
+            </a:r>
+            <a:r>
+              <a:rPr lang="tr-TR" sz="2800" b="1" dirty="0" smtClean="0">
+                <a:solidFill>
+                  <a:schemeClr val="accent1">
+                    <a:lumMod val="50000"/>
+                  </a:schemeClr>
+                </a:solidFill>
+                <a:cs typeface="Arial" panose="020B0604020202020204" pitchFamily="34" charset="0"/>
+              </a:rPr>
+              <a:t> </a:t>
+            </a:r>
+            <a:r>
+              <a:rPr lang="tr-TR" sz="2800" b="1" dirty="0" err="1" smtClean="0">
+                <a:solidFill>
+                  <a:schemeClr val="accent1">
+                    <a:lumMod val="50000"/>
+                  </a:schemeClr>
+                </a:solidFill>
+                <a:cs typeface="Arial" panose="020B0604020202020204" pitchFamily="34" charset="0"/>
+              </a:rPr>
+              <a:t>Winding</a:t>
+            </a:r>
+            <a:r>
+              <a:rPr lang="tr-TR" sz="2800" b="1" dirty="0" smtClean="0">
+                <a:solidFill>
+                  <a:schemeClr val="accent1">
+                    <a:lumMod val="50000"/>
+                  </a:schemeClr>
+                </a:solidFill>
+                <a:cs typeface="Arial" panose="020B0604020202020204" pitchFamily="34" charset="0"/>
+              </a:rPr>
+              <a:t> </a:t>
+            </a:r>
+            <a:r>
+              <a:rPr lang="tr-TR" sz="2800" b="1" dirty="0" err="1" smtClean="0">
+                <a:solidFill>
+                  <a:schemeClr val="accent1">
+                    <a:lumMod val="50000"/>
+                  </a:schemeClr>
+                </a:solidFill>
+                <a:cs typeface="Arial" panose="020B0604020202020204" pitchFamily="34" charset="0"/>
+              </a:rPr>
+              <a:t>Machines</a:t>
+            </a:r>
+            <a:endParaRPr lang="en-US" sz="2800" dirty="0">
+              <a:solidFill>
+                <a:schemeClr val="accent1">
+                  <a:lumMod val="50000"/>
+                </a:schemeClr>
+              </a:solidFill>
+              <a:cs typeface="Arial" panose="020B0604020202020204" pitchFamily="34" charset="0"/>
+            </a:endParaRPr>
+          </a:p>
+        </p:txBody>
+      </p:sp>
+      <p:sp>
+        <p:nvSpPr>
+          <p:cNvPr id="6" name="Rectangle 5"/>
+          <p:cNvSpPr/>
+          <p:nvPr/>
+        </p:nvSpPr>
+        <p:spPr>
+          <a:xfrm>
+            <a:off x="333702" y="673889"/>
+            <a:ext cx="8744983" cy="400110"/>
+          </a:xfrm>
+          <a:prstGeom prst="rect">
+            <a:avLst/>
+          </a:prstGeom>
+        </p:spPr>
+        <p:txBody>
+          <a:bodyPr wrap="square">
+            <a:spAutoFit/>
+          </a:bodyPr>
+          <a:lstStyle/>
+          <a:p>
+            <a:pPr algn="ctr"/>
+            <a:r>
+              <a:rPr lang="tr-TR" sz="2000" b="1" dirty="0" smtClean="0">
+                <a:solidFill>
+                  <a:srgbClr val="002060"/>
+                </a:solidFill>
+                <a:cs typeface="Arial" panose="020B0604020202020204" pitchFamily="34" charset="0"/>
+              </a:rPr>
+              <a:t>Rotor </a:t>
+            </a:r>
+            <a:r>
+              <a:rPr lang="tr-TR" sz="2000" b="1" dirty="0" err="1" smtClean="0">
+                <a:solidFill>
+                  <a:srgbClr val="002060"/>
+                </a:solidFill>
+                <a:cs typeface="Arial" panose="020B0604020202020204" pitchFamily="34" charset="0"/>
+              </a:rPr>
+              <a:t>losses</a:t>
+            </a:r>
+            <a:r>
+              <a:rPr lang="tr-TR" sz="2000" b="1" dirty="0" smtClean="0">
+                <a:solidFill>
+                  <a:srgbClr val="002060"/>
+                </a:solidFill>
+                <a:cs typeface="Arial" panose="020B0604020202020204" pitchFamily="34" charset="0"/>
+              </a:rPr>
+              <a:t>: MMF </a:t>
+            </a:r>
+            <a:r>
+              <a:rPr lang="tr-TR" sz="2000" b="1" dirty="0" err="1" smtClean="0">
+                <a:solidFill>
+                  <a:srgbClr val="002060"/>
+                </a:solidFill>
+                <a:cs typeface="Arial" panose="020B0604020202020204" pitchFamily="34" charset="0"/>
+              </a:rPr>
+              <a:t>harmonics</a:t>
+            </a:r>
+            <a:endParaRPr lang="tr-TR" sz="2000" b="1" dirty="0" smtClean="0">
+              <a:solidFill>
+                <a:srgbClr val="002060"/>
+              </a:solidFill>
+              <a:cs typeface="Arial" panose="020B0604020202020204" pitchFamily="34" charset="0"/>
+            </a:endParaRPr>
+          </a:p>
+        </p:txBody>
+      </p:sp>
+      <p:pic>
+        <p:nvPicPr>
+          <p:cNvPr id="3" name="Picture 2"/>
+          <p:cNvPicPr>
+            <a:picLocks noChangeAspect="1"/>
+          </p:cNvPicPr>
+          <p:nvPr/>
+        </p:nvPicPr>
+        <p:blipFill>
+          <a:blip r:embed="rId3"/>
+          <a:stretch>
+            <a:fillRect/>
+          </a:stretch>
+        </p:blipFill>
+        <p:spPr>
+          <a:xfrm>
+            <a:off x="1309173" y="4284164"/>
+            <a:ext cx="6547419" cy="2467225"/>
+          </a:xfrm>
+          <a:prstGeom prst="rect">
+            <a:avLst/>
+          </a:prstGeom>
+        </p:spPr>
+      </p:pic>
+      <p:pic>
+        <p:nvPicPr>
+          <p:cNvPr id="9" name="Picture 8"/>
+          <p:cNvPicPr>
+            <a:picLocks noChangeAspect="1"/>
+          </p:cNvPicPr>
+          <p:nvPr/>
+        </p:nvPicPr>
+        <p:blipFill>
+          <a:blip r:embed="rId4"/>
+          <a:stretch>
+            <a:fillRect/>
+          </a:stretch>
+        </p:blipFill>
+        <p:spPr>
+          <a:xfrm>
+            <a:off x="971718" y="1791113"/>
+            <a:ext cx="7222331" cy="2493051"/>
+          </a:xfrm>
+          <a:prstGeom prst="rect">
+            <a:avLst/>
+          </a:prstGeom>
+        </p:spPr>
+      </p:pic>
+      <p:sp>
+        <p:nvSpPr>
+          <p:cNvPr id="10" name="Rectangle 9"/>
+          <p:cNvSpPr/>
+          <p:nvPr/>
+        </p:nvSpPr>
+        <p:spPr>
+          <a:xfrm>
+            <a:off x="0" y="1247890"/>
+            <a:ext cx="9144000" cy="369332"/>
+          </a:xfrm>
+          <a:prstGeom prst="rect">
+            <a:avLst/>
+          </a:prstGeom>
+        </p:spPr>
+        <p:txBody>
+          <a:bodyPr wrap="square">
+            <a:spAutoFit/>
+          </a:bodyPr>
+          <a:lstStyle/>
+          <a:p>
+            <a:pPr algn="ctr"/>
+            <a:r>
+              <a:rPr lang="tr-TR" dirty="0" err="1" smtClean="0">
+                <a:solidFill>
+                  <a:srgbClr val="002060"/>
+                </a:solidFill>
+              </a:rPr>
+              <a:t>Integral</a:t>
+            </a:r>
+            <a:r>
+              <a:rPr lang="tr-TR" dirty="0" smtClean="0">
+                <a:solidFill>
+                  <a:srgbClr val="002060"/>
+                </a:solidFill>
+              </a:rPr>
+              <a:t> </a:t>
+            </a:r>
+            <a:r>
+              <a:rPr lang="tr-TR" dirty="0" err="1" smtClean="0">
+                <a:solidFill>
+                  <a:srgbClr val="002060"/>
+                </a:solidFill>
+              </a:rPr>
+              <a:t>slot</a:t>
+            </a:r>
+            <a:r>
+              <a:rPr lang="tr-TR" dirty="0" smtClean="0">
+                <a:solidFill>
+                  <a:srgbClr val="002060"/>
+                </a:solidFill>
+              </a:rPr>
+              <a:t> </a:t>
+            </a:r>
+            <a:r>
+              <a:rPr lang="tr-TR" dirty="0" err="1" smtClean="0">
+                <a:solidFill>
+                  <a:srgbClr val="002060"/>
+                </a:solidFill>
+              </a:rPr>
+              <a:t>vs</a:t>
+            </a:r>
+            <a:r>
+              <a:rPr lang="tr-TR" dirty="0" smtClean="0">
+                <a:solidFill>
+                  <a:srgbClr val="002060"/>
+                </a:solidFill>
+              </a:rPr>
+              <a:t> </a:t>
+            </a:r>
+            <a:r>
+              <a:rPr lang="tr-TR" dirty="0" err="1" smtClean="0">
+                <a:solidFill>
+                  <a:srgbClr val="002060"/>
+                </a:solidFill>
+              </a:rPr>
+              <a:t>fractional</a:t>
+            </a:r>
+            <a:r>
+              <a:rPr lang="tr-TR" dirty="0" smtClean="0">
+                <a:solidFill>
+                  <a:srgbClr val="002060"/>
+                </a:solidFill>
+              </a:rPr>
+              <a:t> </a:t>
+            </a:r>
+            <a:r>
+              <a:rPr lang="tr-TR" dirty="0" err="1" smtClean="0">
+                <a:solidFill>
+                  <a:srgbClr val="002060"/>
+                </a:solidFill>
+              </a:rPr>
+              <a:t>slot</a:t>
+            </a:r>
+            <a:r>
+              <a:rPr lang="tr-TR" dirty="0" smtClean="0">
+                <a:solidFill>
+                  <a:srgbClr val="002060"/>
+                </a:solidFill>
+              </a:rPr>
+              <a:t> </a:t>
+            </a:r>
+            <a:r>
+              <a:rPr lang="tr-TR" dirty="0" smtClean="0">
+                <a:solidFill>
+                  <a:srgbClr val="FF0000"/>
+                </a:solidFill>
+              </a:rPr>
+              <a:t>(bu ildiğimiz ve boyun eğdiğimiz bir şey)</a:t>
+            </a:r>
+            <a:endParaRPr lang="en-US" dirty="0">
+              <a:solidFill>
+                <a:srgbClr val="FF0000"/>
+              </a:solidFill>
+            </a:endParaRPr>
+          </a:p>
+        </p:txBody>
+      </p:sp>
+    </p:spTree>
+    <p:extLst>
+      <p:ext uri="{BB962C8B-B14F-4D97-AF65-F5344CB8AC3E}">
+        <p14:creationId xmlns:p14="http://schemas.microsoft.com/office/powerpoint/2010/main" val="389040452"/>
+      </p:ext>
+    </p:extLst>
+  </p:cSld>
+  <p:clrMapOvr>
+    <a:masterClrMapping/>
+  </p:clrMapOvr>
+  <p:timing>
+    <p:tnLst>
+      <p:par>
+        <p:cTn id="1" dur="indefinite" restart="never" nodeType="tmRoot"/>
+      </p:par>
+    </p:tnLst>
+  </p:timing>
+</p:sld>
+</file>
+
+<file path=ppt/slides/slide61.xml><?xml version="1.0" encoding="utf-8"?>
+<p:sld xmlns:a="http://schemas.openxmlformats.org/drawingml/2006/main" xmlns:r="http://schemas.openxmlformats.org/officeDocument/2006/relationships" xmlns:p="http://schemas.openxmlformats.org/presentationml/2006/main">
+  <p:cSld>
+    <p:spTree>
+      <p:nvGrpSpPr>
+        <p:cNvPr id="1" name=""/>
+        <p:cNvGrpSpPr/>
+        <p:nvPr/>
+      </p:nvGrpSpPr>
+      <p:grpSpPr>
+        <a:xfrm>
+          <a:off x="0" y="0"/>
+          <a:ext cx="0" cy="0"/>
+          <a:chOff x="0" y="0"/>
+          <a:chExt cx="0" cy="0"/>
+        </a:xfrm>
+      </p:grpSpPr>
+      <p:sp>
+        <p:nvSpPr>
+          <p:cNvPr id="8" name="Rectangle 7"/>
+          <p:cNvSpPr/>
+          <p:nvPr/>
+        </p:nvSpPr>
+        <p:spPr>
+          <a:xfrm>
+            <a:off x="478970" y="150669"/>
+            <a:ext cx="8207829" cy="523220"/>
+          </a:xfrm>
+          <a:prstGeom prst="rect">
+            <a:avLst/>
+          </a:prstGeom>
+        </p:spPr>
+        <p:txBody>
+          <a:bodyPr wrap="square">
+            <a:spAutoFit/>
+          </a:bodyPr>
+          <a:lstStyle/>
+          <a:p>
+            <a:pPr algn="ctr"/>
+            <a:r>
+              <a:rPr lang="tr-TR" sz="2800" b="1" dirty="0" err="1" smtClean="0">
+                <a:solidFill>
+                  <a:schemeClr val="accent1">
+                    <a:lumMod val="50000"/>
+                  </a:schemeClr>
+                </a:solidFill>
+                <a:cs typeface="Arial" panose="020B0604020202020204" pitchFamily="34" charset="0"/>
+              </a:rPr>
+              <a:t>Fractional</a:t>
+            </a:r>
+            <a:r>
+              <a:rPr lang="tr-TR" sz="2800" b="1" dirty="0" smtClean="0">
+                <a:solidFill>
+                  <a:schemeClr val="accent1">
+                    <a:lumMod val="50000"/>
+                  </a:schemeClr>
+                </a:solidFill>
+                <a:cs typeface="Arial" panose="020B0604020202020204" pitchFamily="34" charset="0"/>
+              </a:rPr>
+              <a:t> </a:t>
+            </a:r>
+            <a:r>
+              <a:rPr lang="tr-TR" sz="2800" b="1" dirty="0" err="1" smtClean="0">
+                <a:solidFill>
+                  <a:schemeClr val="accent1">
+                    <a:lumMod val="50000"/>
+                  </a:schemeClr>
+                </a:solidFill>
+                <a:cs typeface="Arial" panose="020B0604020202020204" pitchFamily="34" charset="0"/>
+              </a:rPr>
+              <a:t>Slot</a:t>
+            </a:r>
+            <a:r>
+              <a:rPr lang="tr-TR" sz="2800" b="1" dirty="0" smtClean="0">
+                <a:solidFill>
+                  <a:schemeClr val="accent1">
+                    <a:lumMod val="50000"/>
+                  </a:schemeClr>
+                </a:solidFill>
+                <a:cs typeface="Arial" panose="020B0604020202020204" pitchFamily="34" charset="0"/>
+              </a:rPr>
+              <a:t> </a:t>
+            </a:r>
+            <a:r>
+              <a:rPr lang="tr-TR" sz="2800" b="1" dirty="0" err="1" smtClean="0">
+                <a:solidFill>
+                  <a:schemeClr val="accent1">
+                    <a:lumMod val="50000"/>
+                  </a:schemeClr>
+                </a:solidFill>
+                <a:cs typeface="Arial" panose="020B0604020202020204" pitchFamily="34" charset="0"/>
+              </a:rPr>
+              <a:t>Concentrated</a:t>
+            </a:r>
+            <a:r>
+              <a:rPr lang="tr-TR" sz="2800" b="1" dirty="0" smtClean="0">
+                <a:solidFill>
+                  <a:schemeClr val="accent1">
+                    <a:lumMod val="50000"/>
+                  </a:schemeClr>
+                </a:solidFill>
+                <a:cs typeface="Arial" panose="020B0604020202020204" pitchFamily="34" charset="0"/>
+              </a:rPr>
+              <a:t> </a:t>
+            </a:r>
+            <a:r>
+              <a:rPr lang="tr-TR" sz="2800" b="1" dirty="0" err="1" smtClean="0">
+                <a:solidFill>
+                  <a:schemeClr val="accent1">
+                    <a:lumMod val="50000"/>
+                  </a:schemeClr>
+                </a:solidFill>
+                <a:cs typeface="Arial" panose="020B0604020202020204" pitchFamily="34" charset="0"/>
+              </a:rPr>
+              <a:t>Winding</a:t>
+            </a:r>
+            <a:r>
+              <a:rPr lang="tr-TR" sz="2800" b="1" dirty="0" smtClean="0">
+                <a:solidFill>
+                  <a:schemeClr val="accent1">
+                    <a:lumMod val="50000"/>
+                  </a:schemeClr>
+                </a:solidFill>
+                <a:cs typeface="Arial" panose="020B0604020202020204" pitchFamily="34" charset="0"/>
+              </a:rPr>
+              <a:t> </a:t>
+            </a:r>
+            <a:r>
+              <a:rPr lang="tr-TR" sz="2800" b="1" dirty="0" err="1" smtClean="0">
+                <a:solidFill>
+                  <a:schemeClr val="accent1">
+                    <a:lumMod val="50000"/>
+                  </a:schemeClr>
+                </a:solidFill>
+                <a:cs typeface="Arial" panose="020B0604020202020204" pitchFamily="34" charset="0"/>
+              </a:rPr>
+              <a:t>Machines</a:t>
+            </a:r>
+            <a:endParaRPr lang="en-US" sz="2800" dirty="0">
+              <a:solidFill>
+                <a:schemeClr val="accent1">
+                  <a:lumMod val="50000"/>
+                </a:schemeClr>
+              </a:solidFill>
+              <a:cs typeface="Arial" panose="020B0604020202020204" pitchFamily="34" charset="0"/>
+            </a:endParaRPr>
+          </a:p>
+        </p:txBody>
+      </p:sp>
+      <p:sp>
+        <p:nvSpPr>
+          <p:cNvPr id="6" name="Rectangle 5"/>
+          <p:cNvSpPr/>
+          <p:nvPr/>
+        </p:nvSpPr>
+        <p:spPr>
+          <a:xfrm>
+            <a:off x="333702" y="673889"/>
+            <a:ext cx="8744983" cy="400110"/>
+          </a:xfrm>
+          <a:prstGeom prst="rect">
+            <a:avLst/>
+          </a:prstGeom>
+        </p:spPr>
+        <p:txBody>
+          <a:bodyPr wrap="square">
+            <a:spAutoFit/>
+          </a:bodyPr>
+          <a:lstStyle/>
+          <a:p>
+            <a:pPr algn="ctr"/>
+            <a:r>
+              <a:rPr lang="tr-TR" sz="2000" b="1" dirty="0" smtClean="0">
+                <a:solidFill>
+                  <a:srgbClr val="002060"/>
+                </a:solidFill>
+                <a:cs typeface="Arial" panose="020B0604020202020204" pitchFamily="34" charset="0"/>
+              </a:rPr>
+              <a:t>Rotor </a:t>
+            </a:r>
+            <a:r>
+              <a:rPr lang="tr-TR" sz="2000" b="1" dirty="0" err="1" smtClean="0">
+                <a:solidFill>
+                  <a:srgbClr val="002060"/>
+                </a:solidFill>
+                <a:cs typeface="Arial" panose="020B0604020202020204" pitchFamily="34" charset="0"/>
+              </a:rPr>
+              <a:t>losses</a:t>
+            </a:r>
+            <a:r>
+              <a:rPr lang="tr-TR" sz="2000" b="1" dirty="0" smtClean="0">
+                <a:solidFill>
+                  <a:srgbClr val="002060"/>
+                </a:solidFill>
+                <a:cs typeface="Arial" panose="020B0604020202020204" pitchFamily="34" charset="0"/>
+              </a:rPr>
+              <a:t>: MMF </a:t>
+            </a:r>
+            <a:r>
+              <a:rPr lang="tr-TR" sz="2000" b="1" dirty="0" err="1" smtClean="0">
+                <a:solidFill>
+                  <a:srgbClr val="002060"/>
+                </a:solidFill>
+                <a:cs typeface="Arial" panose="020B0604020202020204" pitchFamily="34" charset="0"/>
+              </a:rPr>
+              <a:t>harmonics</a:t>
+            </a:r>
+            <a:endParaRPr lang="tr-TR" sz="2000" b="1" dirty="0" smtClean="0">
+              <a:solidFill>
+                <a:srgbClr val="002060"/>
+              </a:solidFill>
+              <a:cs typeface="Arial" panose="020B0604020202020204" pitchFamily="34" charset="0"/>
+            </a:endParaRPr>
+          </a:p>
+        </p:txBody>
+      </p:sp>
+      <p:sp>
+        <p:nvSpPr>
+          <p:cNvPr id="10" name="Rectangle 9"/>
+          <p:cNvSpPr/>
+          <p:nvPr/>
+        </p:nvSpPr>
+        <p:spPr>
+          <a:xfrm>
+            <a:off x="0" y="1063224"/>
+            <a:ext cx="9144000" cy="369332"/>
+          </a:xfrm>
+          <a:prstGeom prst="rect">
+            <a:avLst/>
+          </a:prstGeom>
+        </p:spPr>
+        <p:txBody>
+          <a:bodyPr wrap="square">
+            <a:spAutoFit/>
+          </a:bodyPr>
+          <a:lstStyle/>
+          <a:p>
+            <a:pPr algn="ctr"/>
+            <a:r>
+              <a:rPr lang="tr-TR" dirty="0" err="1" smtClean="0">
+                <a:solidFill>
+                  <a:srgbClr val="002060"/>
+                </a:solidFill>
+              </a:rPr>
+              <a:t>Layer</a:t>
+            </a:r>
+            <a:r>
+              <a:rPr lang="tr-TR" dirty="0" smtClean="0">
+                <a:solidFill>
+                  <a:srgbClr val="002060"/>
+                </a:solidFill>
+              </a:rPr>
+              <a:t> sayısı karşılaştırması</a:t>
+            </a:r>
+            <a:endParaRPr lang="en-US" dirty="0">
+              <a:solidFill>
+                <a:srgbClr val="FF0000"/>
+              </a:solidFill>
+            </a:endParaRPr>
+          </a:p>
+        </p:txBody>
+      </p:sp>
+      <p:pic>
+        <p:nvPicPr>
+          <p:cNvPr id="2" name="Picture 1"/>
+          <p:cNvPicPr>
+            <a:picLocks noChangeAspect="1"/>
+          </p:cNvPicPr>
+          <p:nvPr/>
+        </p:nvPicPr>
+        <p:blipFill rotWithShape="1">
+          <a:blip r:embed="rId3"/>
+          <a:srcRect b="13658"/>
+          <a:stretch/>
+        </p:blipFill>
+        <p:spPr>
+          <a:xfrm>
+            <a:off x="1036687" y="1363859"/>
+            <a:ext cx="7094084" cy="2249537"/>
+          </a:xfrm>
+          <a:prstGeom prst="rect">
+            <a:avLst/>
+          </a:prstGeom>
+        </p:spPr>
+      </p:pic>
+      <p:pic>
+        <p:nvPicPr>
+          <p:cNvPr id="4" name="Picture 3"/>
+          <p:cNvPicPr>
+            <a:picLocks noChangeAspect="1"/>
+          </p:cNvPicPr>
+          <p:nvPr/>
+        </p:nvPicPr>
+        <p:blipFill>
+          <a:blip r:embed="rId4"/>
+          <a:stretch>
+            <a:fillRect/>
+          </a:stretch>
+        </p:blipFill>
+        <p:spPr>
+          <a:xfrm>
+            <a:off x="1335023" y="3343975"/>
+            <a:ext cx="6742339" cy="2066890"/>
+          </a:xfrm>
+          <a:prstGeom prst="rect">
+            <a:avLst/>
+          </a:prstGeom>
+        </p:spPr>
+      </p:pic>
+      <p:sp>
+        <p:nvSpPr>
+          <p:cNvPr id="11" name="Rectangle 10"/>
+          <p:cNvSpPr/>
+          <p:nvPr/>
+        </p:nvSpPr>
+        <p:spPr>
+          <a:xfrm>
+            <a:off x="182334" y="5445555"/>
+            <a:ext cx="8504465" cy="1077218"/>
+          </a:xfrm>
+          <a:prstGeom prst="rect">
+            <a:avLst/>
+          </a:prstGeom>
+        </p:spPr>
+        <p:txBody>
+          <a:bodyPr wrap="square">
+            <a:spAutoFit/>
+          </a:bodyPr>
+          <a:lstStyle/>
+          <a:p>
+            <a:r>
+              <a:rPr lang="tr-TR" sz="1600" b="1" dirty="0" smtClean="0">
+                <a:solidFill>
+                  <a:srgbClr val="002060"/>
+                </a:solidFill>
+              </a:rPr>
+              <a:t>Buradaki </a:t>
+            </a:r>
+            <a:r>
+              <a:rPr lang="tr-TR" sz="1600" b="1" dirty="0" err="1" smtClean="0">
+                <a:solidFill>
+                  <a:srgbClr val="002060"/>
+                </a:solidFill>
+              </a:rPr>
+              <a:t>trade-off</a:t>
+            </a:r>
+            <a:r>
+              <a:rPr lang="tr-TR" sz="1600" b="1" dirty="0">
+                <a:solidFill>
+                  <a:srgbClr val="002060"/>
+                </a:solidFill>
+              </a:rPr>
+              <a:t>:</a:t>
+            </a:r>
+            <a:r>
+              <a:rPr lang="tr-TR" sz="1600" dirty="0" smtClean="0">
+                <a:solidFill>
+                  <a:srgbClr val="002060"/>
+                </a:solidFill>
+              </a:rPr>
+              <a:t> </a:t>
+            </a:r>
+            <a:r>
+              <a:rPr lang="tr-TR" sz="1600" dirty="0" err="1" smtClean="0">
+                <a:solidFill>
+                  <a:srgbClr val="002060"/>
+                </a:solidFill>
+              </a:rPr>
+              <a:t>isolation</a:t>
+            </a:r>
+            <a:r>
+              <a:rPr lang="tr-TR" sz="1600" dirty="0" smtClean="0">
+                <a:solidFill>
+                  <a:srgbClr val="002060"/>
+                </a:solidFill>
+              </a:rPr>
+              <a:t> </a:t>
+            </a:r>
+            <a:r>
+              <a:rPr lang="tr-TR" sz="1600" dirty="0" err="1" smtClean="0">
+                <a:solidFill>
+                  <a:srgbClr val="002060"/>
+                </a:solidFill>
+              </a:rPr>
+              <a:t>vs</a:t>
+            </a:r>
+            <a:r>
+              <a:rPr lang="tr-TR" sz="1600" dirty="0" smtClean="0">
+                <a:solidFill>
+                  <a:srgbClr val="002060"/>
+                </a:solidFill>
+              </a:rPr>
+              <a:t> MMF </a:t>
+            </a:r>
+            <a:r>
+              <a:rPr lang="tr-TR" sz="1600" dirty="0" err="1" smtClean="0">
+                <a:solidFill>
+                  <a:srgbClr val="002060"/>
+                </a:solidFill>
+              </a:rPr>
+              <a:t>harmonic</a:t>
+            </a:r>
+            <a:r>
+              <a:rPr lang="tr-TR" sz="1600" dirty="0" smtClean="0">
+                <a:solidFill>
+                  <a:srgbClr val="002060"/>
+                </a:solidFill>
+              </a:rPr>
+              <a:t> </a:t>
+            </a:r>
+            <a:r>
+              <a:rPr lang="tr-TR" sz="1600" dirty="0" err="1" smtClean="0">
+                <a:solidFill>
+                  <a:srgbClr val="002060"/>
+                </a:solidFill>
+              </a:rPr>
+              <a:t>content</a:t>
+            </a:r>
+            <a:endParaRPr lang="tr-TR" sz="1600" dirty="0" smtClean="0">
+              <a:solidFill>
+                <a:srgbClr val="002060"/>
+              </a:solidFill>
+            </a:endParaRPr>
+          </a:p>
+          <a:p>
+            <a:endParaRPr lang="tr-TR" sz="1600" dirty="0">
+              <a:solidFill>
+                <a:srgbClr val="002060"/>
+              </a:solidFill>
+            </a:endParaRPr>
+          </a:p>
+          <a:p>
+            <a:r>
+              <a:rPr lang="en-US" sz="1600" dirty="0">
+                <a:solidFill>
+                  <a:srgbClr val="002060"/>
+                </a:solidFill>
+              </a:rPr>
+              <a:t>In general terms, rotor losses tend to decrease when the number of poles and slots increase, while keeping the same 2p/Q ratio.</a:t>
+            </a:r>
+            <a:r>
+              <a:rPr lang="tr-TR" sz="1600" dirty="0">
+                <a:solidFill>
+                  <a:srgbClr val="002060"/>
+                </a:solidFill>
+              </a:rPr>
+              <a:t> </a:t>
+            </a:r>
+            <a:r>
+              <a:rPr lang="tr-TR" sz="1600" dirty="0">
+                <a:solidFill>
+                  <a:srgbClr val="FF0000"/>
+                </a:solidFill>
+              </a:rPr>
+              <a:t>=&gt; </a:t>
+            </a:r>
+            <a:r>
+              <a:rPr lang="tr-TR" sz="1600" dirty="0" err="1">
+                <a:solidFill>
+                  <a:srgbClr val="FF0000"/>
+                </a:solidFill>
+              </a:rPr>
+              <a:t>Qs</a:t>
+            </a:r>
+            <a:r>
+              <a:rPr lang="tr-TR" sz="1600" dirty="0">
+                <a:solidFill>
+                  <a:srgbClr val="FF0000"/>
+                </a:solidFill>
+              </a:rPr>
+              <a:t> ve p arttıkça, yüksek katman sayısının yarattığı avantaj azalıyor</a:t>
+            </a:r>
+            <a:r>
+              <a:rPr lang="tr-TR" sz="1600" dirty="0" smtClean="0">
+                <a:solidFill>
+                  <a:srgbClr val="FF0000"/>
+                </a:solidFill>
+              </a:rPr>
+              <a:t>.</a:t>
+            </a:r>
+            <a:endParaRPr lang="en-US" sz="1600" dirty="0">
+              <a:solidFill>
+                <a:srgbClr val="FF0000"/>
+              </a:solidFill>
+            </a:endParaRPr>
+          </a:p>
+        </p:txBody>
+      </p:sp>
+    </p:spTree>
+    <p:extLst>
+      <p:ext uri="{BB962C8B-B14F-4D97-AF65-F5344CB8AC3E}">
+        <p14:creationId xmlns:p14="http://schemas.microsoft.com/office/powerpoint/2010/main" val="2825504913"/>
+      </p:ext>
+    </p:extLst>
+  </p:cSld>
+  <p:clrMapOvr>
+    <a:masterClrMapping/>
+  </p:clrMapOvr>
+  <p:timing>
+    <p:tnLst>
+      <p:par>
+        <p:cTn id="1" dur="indefinite" restart="never" nodeType="tmRoot"/>
+      </p:par>
+    </p:tnLst>
+  </p:timing>
+</p:sld>
+</file>
+
+<file path=ppt/slides/slide62.xml><?xml version="1.0" encoding="utf-8"?>
+<p:sld xmlns:a="http://schemas.openxmlformats.org/drawingml/2006/main" xmlns:r="http://schemas.openxmlformats.org/officeDocument/2006/relationships" xmlns:p="http://schemas.openxmlformats.org/presentationml/2006/main">
+  <p:cSld>
+    <p:spTree>
+      <p:nvGrpSpPr>
+        <p:cNvPr id="1" name=""/>
+        <p:cNvGrpSpPr/>
+        <p:nvPr/>
+      </p:nvGrpSpPr>
+      <p:grpSpPr>
+        <a:xfrm>
+          <a:off x="0" y="0"/>
+          <a:ext cx="0" cy="0"/>
+          <a:chOff x="0" y="0"/>
+          <a:chExt cx="0" cy="0"/>
+        </a:xfrm>
+      </p:grpSpPr>
+      <p:sp>
+        <p:nvSpPr>
+          <p:cNvPr id="8" name="Rectangle 7"/>
+          <p:cNvSpPr/>
+          <p:nvPr/>
+        </p:nvSpPr>
+        <p:spPr>
+          <a:xfrm>
+            <a:off x="478970" y="150669"/>
+            <a:ext cx="8207829" cy="523220"/>
+          </a:xfrm>
+          <a:prstGeom prst="rect">
+            <a:avLst/>
+          </a:prstGeom>
+        </p:spPr>
+        <p:txBody>
+          <a:bodyPr wrap="square">
+            <a:spAutoFit/>
+          </a:bodyPr>
+          <a:lstStyle/>
+          <a:p>
+            <a:pPr algn="ctr"/>
+            <a:r>
+              <a:rPr lang="tr-TR" sz="2800" b="1" dirty="0" err="1" smtClean="0">
+                <a:solidFill>
+                  <a:schemeClr val="accent1">
+                    <a:lumMod val="50000"/>
+                  </a:schemeClr>
+                </a:solidFill>
+                <a:cs typeface="Arial" panose="020B0604020202020204" pitchFamily="34" charset="0"/>
+              </a:rPr>
+              <a:t>Fractional</a:t>
+            </a:r>
+            <a:r>
+              <a:rPr lang="tr-TR" sz="2800" b="1" dirty="0" smtClean="0">
+                <a:solidFill>
+                  <a:schemeClr val="accent1">
+                    <a:lumMod val="50000"/>
+                  </a:schemeClr>
+                </a:solidFill>
+                <a:cs typeface="Arial" panose="020B0604020202020204" pitchFamily="34" charset="0"/>
+              </a:rPr>
+              <a:t> </a:t>
+            </a:r>
+            <a:r>
+              <a:rPr lang="tr-TR" sz="2800" b="1" dirty="0" err="1" smtClean="0">
+                <a:solidFill>
+                  <a:schemeClr val="accent1">
+                    <a:lumMod val="50000"/>
+                  </a:schemeClr>
+                </a:solidFill>
+                <a:cs typeface="Arial" panose="020B0604020202020204" pitchFamily="34" charset="0"/>
+              </a:rPr>
+              <a:t>Slot</a:t>
+            </a:r>
+            <a:r>
+              <a:rPr lang="tr-TR" sz="2800" b="1" dirty="0" smtClean="0">
+                <a:solidFill>
+                  <a:schemeClr val="accent1">
+                    <a:lumMod val="50000"/>
+                  </a:schemeClr>
+                </a:solidFill>
+                <a:cs typeface="Arial" panose="020B0604020202020204" pitchFamily="34" charset="0"/>
+              </a:rPr>
+              <a:t> </a:t>
+            </a:r>
+            <a:r>
+              <a:rPr lang="tr-TR" sz="2800" b="1" dirty="0" err="1" smtClean="0">
+                <a:solidFill>
+                  <a:schemeClr val="accent1">
+                    <a:lumMod val="50000"/>
+                  </a:schemeClr>
+                </a:solidFill>
+                <a:cs typeface="Arial" panose="020B0604020202020204" pitchFamily="34" charset="0"/>
+              </a:rPr>
+              <a:t>Concentrated</a:t>
+            </a:r>
+            <a:r>
+              <a:rPr lang="tr-TR" sz="2800" b="1" dirty="0" smtClean="0">
+                <a:solidFill>
+                  <a:schemeClr val="accent1">
+                    <a:lumMod val="50000"/>
+                  </a:schemeClr>
+                </a:solidFill>
+                <a:cs typeface="Arial" panose="020B0604020202020204" pitchFamily="34" charset="0"/>
+              </a:rPr>
+              <a:t> </a:t>
+            </a:r>
+            <a:r>
+              <a:rPr lang="tr-TR" sz="2800" b="1" dirty="0" err="1" smtClean="0">
+                <a:solidFill>
+                  <a:schemeClr val="accent1">
+                    <a:lumMod val="50000"/>
+                  </a:schemeClr>
+                </a:solidFill>
+                <a:cs typeface="Arial" panose="020B0604020202020204" pitchFamily="34" charset="0"/>
+              </a:rPr>
+              <a:t>Winding</a:t>
+            </a:r>
+            <a:r>
+              <a:rPr lang="tr-TR" sz="2800" b="1" dirty="0" smtClean="0">
+                <a:solidFill>
+                  <a:schemeClr val="accent1">
+                    <a:lumMod val="50000"/>
+                  </a:schemeClr>
+                </a:solidFill>
+                <a:cs typeface="Arial" panose="020B0604020202020204" pitchFamily="34" charset="0"/>
+              </a:rPr>
+              <a:t> </a:t>
+            </a:r>
+            <a:r>
+              <a:rPr lang="tr-TR" sz="2800" b="1" dirty="0" err="1" smtClean="0">
+                <a:solidFill>
+                  <a:schemeClr val="accent1">
+                    <a:lumMod val="50000"/>
+                  </a:schemeClr>
+                </a:solidFill>
+                <a:cs typeface="Arial" panose="020B0604020202020204" pitchFamily="34" charset="0"/>
+              </a:rPr>
+              <a:t>Machines</a:t>
+            </a:r>
+            <a:endParaRPr lang="en-US" sz="2800" dirty="0">
+              <a:solidFill>
+                <a:schemeClr val="accent1">
+                  <a:lumMod val="50000"/>
+                </a:schemeClr>
+              </a:solidFill>
+              <a:cs typeface="Arial" panose="020B0604020202020204" pitchFamily="34" charset="0"/>
+            </a:endParaRPr>
+          </a:p>
+        </p:txBody>
+      </p:sp>
+      <p:sp>
+        <p:nvSpPr>
+          <p:cNvPr id="6" name="Rectangle 5"/>
+          <p:cNvSpPr/>
+          <p:nvPr/>
+        </p:nvSpPr>
+        <p:spPr>
+          <a:xfrm>
+            <a:off x="333702" y="673889"/>
+            <a:ext cx="8744983" cy="400110"/>
+          </a:xfrm>
+          <a:prstGeom prst="rect">
+            <a:avLst/>
+          </a:prstGeom>
+        </p:spPr>
+        <p:txBody>
+          <a:bodyPr wrap="square">
+            <a:spAutoFit/>
+          </a:bodyPr>
+          <a:lstStyle/>
+          <a:p>
+            <a:pPr algn="ctr"/>
+            <a:r>
+              <a:rPr lang="tr-TR" sz="2000" b="1" dirty="0" smtClean="0">
+                <a:solidFill>
+                  <a:srgbClr val="002060"/>
+                </a:solidFill>
+                <a:cs typeface="Arial" panose="020B0604020202020204" pitchFamily="34" charset="0"/>
+              </a:rPr>
+              <a:t>MMF </a:t>
+            </a:r>
+            <a:r>
+              <a:rPr lang="tr-TR" sz="2000" b="1" dirty="0" err="1" smtClean="0">
+                <a:solidFill>
+                  <a:srgbClr val="002060"/>
+                </a:solidFill>
+                <a:cs typeface="Arial" panose="020B0604020202020204" pitchFamily="34" charset="0"/>
+              </a:rPr>
+              <a:t>sub-harmonics</a:t>
+            </a:r>
+            <a:endParaRPr lang="tr-TR" sz="2000" b="1" dirty="0" smtClean="0">
+              <a:solidFill>
+                <a:srgbClr val="002060"/>
+              </a:solidFill>
+              <a:cs typeface="Arial" panose="020B0604020202020204" pitchFamily="34" charset="0"/>
+            </a:endParaRPr>
+          </a:p>
+        </p:txBody>
+      </p:sp>
+      <p:sp>
+        <p:nvSpPr>
+          <p:cNvPr id="10" name="Rectangle 9"/>
+          <p:cNvSpPr/>
+          <p:nvPr/>
+        </p:nvSpPr>
+        <p:spPr>
+          <a:xfrm>
+            <a:off x="333702" y="1063224"/>
+            <a:ext cx="8426577" cy="1200329"/>
+          </a:xfrm>
+          <a:prstGeom prst="rect">
+            <a:avLst/>
+          </a:prstGeom>
+        </p:spPr>
+        <p:txBody>
+          <a:bodyPr wrap="square">
+            <a:spAutoFit/>
+          </a:bodyPr>
+          <a:lstStyle/>
+          <a:p>
+            <a:pPr marL="285750" indent="-285750">
+              <a:buFont typeface="Wingdings" panose="05000000000000000000" pitchFamily="2" charset="2"/>
+              <a:buChar char="§"/>
+            </a:pPr>
+            <a:r>
+              <a:rPr lang="en-US" dirty="0">
+                <a:solidFill>
+                  <a:srgbClr val="002060"/>
+                </a:solidFill>
+              </a:rPr>
+              <a:t>MMF subharmonics are those with harmonic order </a:t>
+            </a:r>
+            <a:r>
+              <a:rPr lang="en-US" b="1" dirty="0">
+                <a:solidFill>
+                  <a:srgbClr val="002060"/>
+                </a:solidFill>
+              </a:rPr>
+              <a:t>ν &lt; p</a:t>
+            </a:r>
+            <a:r>
+              <a:rPr lang="en-US" b="1" dirty="0" smtClean="0">
+                <a:solidFill>
+                  <a:srgbClr val="002060"/>
+                </a:solidFill>
+              </a:rPr>
+              <a:t>.</a:t>
+            </a:r>
+            <a:endParaRPr lang="tr-TR" b="1" dirty="0" smtClean="0">
+              <a:solidFill>
+                <a:srgbClr val="002060"/>
+              </a:solidFill>
+            </a:endParaRPr>
+          </a:p>
+          <a:p>
+            <a:pPr marL="285750" indent="-285750">
+              <a:buFont typeface="Wingdings" panose="05000000000000000000" pitchFamily="2" charset="2"/>
+              <a:buChar char="§"/>
+            </a:pPr>
+            <a:r>
+              <a:rPr lang="en-US" b="1" dirty="0">
+                <a:solidFill>
+                  <a:srgbClr val="002060"/>
+                </a:solidFill>
+              </a:rPr>
+              <a:t>Almost all FSCWs</a:t>
+            </a:r>
+            <a:r>
+              <a:rPr lang="en-US" dirty="0">
+                <a:solidFill>
+                  <a:srgbClr val="002060"/>
+                </a:solidFill>
+              </a:rPr>
+              <a:t>, except those with q = 1/2, lead to armature MMF </a:t>
+            </a:r>
+            <a:r>
+              <a:rPr lang="en-US" dirty="0" smtClean="0">
+                <a:solidFill>
+                  <a:srgbClr val="002060"/>
+                </a:solidFill>
+              </a:rPr>
+              <a:t>subharmonics</a:t>
+            </a:r>
+            <a:endParaRPr lang="tr-TR" dirty="0" smtClean="0">
+              <a:solidFill>
+                <a:srgbClr val="002060"/>
+              </a:solidFill>
+            </a:endParaRPr>
+          </a:p>
+          <a:p>
+            <a:pPr marL="285750" indent="-285750">
+              <a:buFont typeface="Wingdings" panose="05000000000000000000" pitchFamily="2" charset="2"/>
+              <a:buChar char="§"/>
+            </a:pPr>
+            <a:r>
+              <a:rPr lang="tr-TR" dirty="0" smtClean="0">
+                <a:solidFill>
+                  <a:srgbClr val="002060"/>
+                </a:solidFill>
+              </a:rPr>
+              <a:t>T</a:t>
+            </a:r>
+            <a:r>
+              <a:rPr lang="en-US" dirty="0" smtClean="0">
+                <a:solidFill>
+                  <a:srgbClr val="002060"/>
+                </a:solidFill>
+              </a:rPr>
+              <a:t>he </a:t>
+            </a:r>
+            <a:r>
+              <a:rPr lang="en-US" dirty="0">
+                <a:solidFill>
+                  <a:srgbClr val="002060"/>
+                </a:solidFill>
+              </a:rPr>
+              <a:t>lower the </a:t>
+            </a:r>
+            <a:r>
+              <a:rPr lang="en-US" b="1" dirty="0">
+                <a:solidFill>
+                  <a:srgbClr val="002060"/>
+                </a:solidFill>
+              </a:rPr>
+              <a:t>number of layers </a:t>
+            </a:r>
+            <a:r>
+              <a:rPr lang="en-US" dirty="0">
+                <a:solidFill>
+                  <a:srgbClr val="002060"/>
+                </a:solidFill>
+              </a:rPr>
+              <a:t>for a particular combination, the higher the MMF subharmonic content</a:t>
+            </a:r>
+            <a:r>
+              <a:rPr lang="en-US" dirty="0" smtClean="0">
+                <a:solidFill>
+                  <a:srgbClr val="002060"/>
+                </a:solidFill>
+              </a:rPr>
+              <a:t>.</a:t>
+            </a:r>
+            <a:endParaRPr lang="tr-TR" dirty="0" smtClean="0">
+              <a:solidFill>
+                <a:srgbClr val="002060"/>
+              </a:solidFill>
+            </a:endParaRPr>
+          </a:p>
+        </p:txBody>
+      </p:sp>
+      <p:pic>
+        <p:nvPicPr>
+          <p:cNvPr id="9" name="Picture 8"/>
+          <p:cNvPicPr>
+            <a:picLocks noChangeAspect="1"/>
+          </p:cNvPicPr>
+          <p:nvPr/>
+        </p:nvPicPr>
+        <p:blipFill>
+          <a:blip r:embed="rId3"/>
+          <a:stretch>
+            <a:fillRect/>
+          </a:stretch>
+        </p:blipFill>
+        <p:spPr>
+          <a:xfrm>
+            <a:off x="458966" y="2416665"/>
+            <a:ext cx="8176048" cy="2506399"/>
+          </a:xfrm>
+          <a:prstGeom prst="rect">
+            <a:avLst/>
+          </a:prstGeom>
+        </p:spPr>
+      </p:pic>
+      <p:cxnSp>
+        <p:nvCxnSpPr>
+          <p:cNvPr id="12" name="Straight Arrow Connector 11"/>
+          <p:cNvCxnSpPr/>
+          <p:nvPr/>
+        </p:nvCxnSpPr>
+        <p:spPr>
+          <a:xfrm flipV="1">
+            <a:off x="1191985" y="2894275"/>
+            <a:ext cx="1967594" cy="1"/>
+          </a:xfrm>
+          <a:prstGeom prst="straightConnector1">
+            <a:avLst/>
+          </a:prstGeom>
+          <a:ln w="19050">
+            <a:solidFill>
+              <a:srgbClr val="FF0000"/>
+            </a:solidFill>
+            <a:tailEnd type="triangle"/>
+          </a:ln>
+        </p:spPr>
+        <p:style>
+          <a:lnRef idx="1">
+            <a:schemeClr val="accent1"/>
+          </a:lnRef>
+          <a:fillRef idx="0">
+            <a:schemeClr val="accent1"/>
+          </a:fillRef>
+          <a:effectRef idx="0">
+            <a:schemeClr val="accent1"/>
+          </a:effectRef>
+          <a:fontRef idx="minor">
+            <a:schemeClr val="tx1"/>
+          </a:fontRef>
+        </p:style>
+      </p:cxnSp>
+      <p:sp>
+        <p:nvSpPr>
+          <p:cNvPr id="13" name="Rectangle 12"/>
+          <p:cNvSpPr/>
+          <p:nvPr/>
+        </p:nvSpPr>
+        <p:spPr>
+          <a:xfrm>
+            <a:off x="2860182" y="2787075"/>
+            <a:ext cx="1964871" cy="584775"/>
+          </a:xfrm>
+          <a:prstGeom prst="rect">
+            <a:avLst/>
+          </a:prstGeom>
+        </p:spPr>
+        <p:txBody>
+          <a:bodyPr wrap="square">
+            <a:spAutoFit/>
+          </a:bodyPr>
+          <a:lstStyle/>
+          <a:p>
+            <a:pPr algn="ctr"/>
+            <a:r>
+              <a:rPr lang="tr-TR" sz="1600" dirty="0" err="1" smtClean="0">
+                <a:solidFill>
+                  <a:srgbClr val="C00000"/>
+                </a:solidFill>
+                <a:cs typeface="Arial" panose="020B0604020202020204" pitchFamily="34" charset="0"/>
+              </a:rPr>
+              <a:t>Sub-harmonic</a:t>
+            </a:r>
+            <a:r>
+              <a:rPr lang="tr-TR" sz="1600" dirty="0" smtClean="0">
+                <a:solidFill>
+                  <a:srgbClr val="C00000"/>
+                </a:solidFill>
+                <a:cs typeface="Arial" panose="020B0604020202020204" pitchFamily="34" charset="0"/>
+              </a:rPr>
+              <a:t>:</a:t>
+            </a:r>
+          </a:p>
+          <a:p>
+            <a:pPr algn="ctr"/>
+            <a:r>
+              <a:rPr lang="tr-TR" sz="1600" dirty="0" smtClean="0">
+                <a:solidFill>
+                  <a:srgbClr val="C00000"/>
+                </a:solidFill>
+                <a:cs typeface="Arial" panose="020B0604020202020204" pitchFamily="34" charset="0"/>
+              </a:rPr>
+              <a:t>Baya </a:t>
+            </a:r>
+            <a:r>
+              <a:rPr lang="tr-TR" sz="1600" dirty="0" err="1" smtClean="0">
+                <a:solidFill>
+                  <a:srgbClr val="C00000"/>
+                </a:solidFill>
+                <a:cs typeface="Arial" panose="020B0604020202020204" pitchFamily="34" charset="0"/>
+              </a:rPr>
+              <a:t>farkediyor</a:t>
+            </a:r>
+            <a:endParaRPr lang="tr-TR" sz="1600" dirty="0" smtClean="0">
+              <a:solidFill>
+                <a:srgbClr val="C00000"/>
+              </a:solidFill>
+              <a:cs typeface="Arial" panose="020B0604020202020204" pitchFamily="34" charset="0"/>
+            </a:endParaRPr>
+          </a:p>
+        </p:txBody>
+      </p:sp>
+      <p:cxnSp>
+        <p:nvCxnSpPr>
+          <p:cNvPr id="14" name="Straight Arrow Connector 13"/>
+          <p:cNvCxnSpPr/>
+          <p:nvPr/>
+        </p:nvCxnSpPr>
+        <p:spPr>
+          <a:xfrm flipH="1" flipV="1">
+            <a:off x="4098471" y="3371850"/>
+            <a:ext cx="1205593" cy="801499"/>
+          </a:xfrm>
+          <a:prstGeom prst="straightConnector1">
+            <a:avLst/>
+          </a:prstGeom>
+          <a:ln w="19050">
+            <a:solidFill>
+              <a:srgbClr val="FF0000"/>
+            </a:solidFill>
+            <a:tailEnd type="triangle"/>
+          </a:ln>
+        </p:spPr>
+        <p:style>
+          <a:lnRef idx="1">
+            <a:schemeClr val="accent1"/>
+          </a:lnRef>
+          <a:fillRef idx="0">
+            <a:schemeClr val="accent1"/>
+          </a:fillRef>
+          <a:effectRef idx="0">
+            <a:schemeClr val="accent1"/>
+          </a:effectRef>
+          <a:fontRef idx="minor">
+            <a:schemeClr val="tx1"/>
+          </a:fontRef>
+        </p:style>
+      </p:cxnSp>
+      <p:sp>
+        <p:nvSpPr>
+          <p:cNvPr id="15" name="Rectangle 14"/>
+          <p:cNvSpPr/>
+          <p:nvPr/>
+        </p:nvSpPr>
+        <p:spPr>
+          <a:xfrm>
+            <a:off x="3718831" y="4584510"/>
+            <a:ext cx="1964871" cy="338554"/>
+          </a:xfrm>
+          <a:prstGeom prst="rect">
+            <a:avLst/>
+          </a:prstGeom>
+        </p:spPr>
+        <p:txBody>
+          <a:bodyPr wrap="square">
+            <a:spAutoFit/>
+          </a:bodyPr>
+          <a:lstStyle/>
+          <a:p>
+            <a:pPr algn="ctr"/>
+            <a:r>
+              <a:rPr lang="tr-TR" sz="1600" dirty="0" smtClean="0">
+                <a:solidFill>
+                  <a:srgbClr val="002060"/>
+                </a:solidFill>
+                <a:cs typeface="Arial" panose="020B0604020202020204" pitchFamily="34" charset="0"/>
+              </a:rPr>
+              <a:t>p = 5</a:t>
+            </a:r>
+          </a:p>
+        </p:txBody>
+      </p:sp>
+      <p:sp>
+        <p:nvSpPr>
+          <p:cNvPr id="16" name="Rectangle 15"/>
+          <p:cNvSpPr/>
+          <p:nvPr/>
+        </p:nvSpPr>
+        <p:spPr>
+          <a:xfrm>
+            <a:off x="333701" y="4939530"/>
+            <a:ext cx="8426577" cy="1477328"/>
+          </a:xfrm>
+          <a:prstGeom prst="rect">
+            <a:avLst/>
+          </a:prstGeom>
+        </p:spPr>
+        <p:txBody>
+          <a:bodyPr wrap="square">
+            <a:spAutoFit/>
+          </a:bodyPr>
+          <a:lstStyle/>
+          <a:p>
+            <a:pPr marL="285750" indent="-285750">
+              <a:buFont typeface="Wingdings" panose="05000000000000000000" pitchFamily="2" charset="2"/>
+              <a:buChar char="§"/>
+            </a:pPr>
+            <a:r>
+              <a:rPr lang="tr-TR" dirty="0" err="1" smtClean="0">
+                <a:solidFill>
+                  <a:srgbClr val="002060"/>
+                </a:solidFill>
+              </a:rPr>
+              <a:t>Have</a:t>
+            </a:r>
+            <a:r>
+              <a:rPr lang="tr-TR" dirty="0" smtClean="0">
+                <a:solidFill>
+                  <a:srgbClr val="002060"/>
+                </a:solidFill>
+              </a:rPr>
+              <a:t> </a:t>
+            </a:r>
+            <a:r>
+              <a:rPr lang="tr-TR" dirty="0" err="1" smtClean="0">
+                <a:solidFill>
+                  <a:srgbClr val="002060"/>
+                </a:solidFill>
+              </a:rPr>
+              <a:t>more</a:t>
+            </a:r>
+            <a:r>
+              <a:rPr lang="tr-TR" dirty="0" smtClean="0">
+                <a:solidFill>
+                  <a:srgbClr val="002060"/>
+                </a:solidFill>
+              </a:rPr>
+              <a:t> </a:t>
+            </a:r>
+            <a:r>
+              <a:rPr lang="tr-TR" dirty="0" err="1" smtClean="0">
+                <a:solidFill>
+                  <a:srgbClr val="002060"/>
+                </a:solidFill>
+              </a:rPr>
+              <a:t>adverse</a:t>
+            </a:r>
+            <a:r>
+              <a:rPr lang="tr-TR" dirty="0" smtClean="0">
+                <a:solidFill>
+                  <a:srgbClr val="002060"/>
+                </a:solidFill>
+              </a:rPr>
+              <a:t> </a:t>
+            </a:r>
+            <a:r>
+              <a:rPr lang="tr-TR" dirty="0" err="1" smtClean="0">
+                <a:solidFill>
+                  <a:srgbClr val="002060"/>
+                </a:solidFill>
+              </a:rPr>
+              <a:t>effect</a:t>
+            </a:r>
+            <a:r>
+              <a:rPr lang="tr-TR" dirty="0" smtClean="0">
+                <a:solidFill>
+                  <a:srgbClr val="002060"/>
+                </a:solidFill>
+              </a:rPr>
+              <a:t> on rotor </a:t>
+            </a:r>
+            <a:r>
+              <a:rPr lang="tr-TR" dirty="0" err="1" smtClean="0">
+                <a:solidFill>
+                  <a:srgbClr val="002060"/>
+                </a:solidFill>
+              </a:rPr>
+              <a:t>losses</a:t>
+            </a:r>
+            <a:r>
+              <a:rPr lang="tr-TR" dirty="0" smtClean="0">
+                <a:solidFill>
+                  <a:srgbClr val="002060"/>
+                </a:solidFill>
+              </a:rPr>
+              <a:t> </a:t>
+            </a:r>
+            <a:r>
+              <a:rPr lang="tr-TR" dirty="0" err="1" smtClean="0">
+                <a:solidFill>
+                  <a:srgbClr val="002060"/>
+                </a:solidFill>
+              </a:rPr>
+              <a:t>due</a:t>
+            </a:r>
+            <a:r>
+              <a:rPr lang="tr-TR" dirty="0" smtClean="0">
+                <a:solidFill>
+                  <a:srgbClr val="002060"/>
+                </a:solidFill>
+              </a:rPr>
+              <a:t> </a:t>
+            </a:r>
+            <a:r>
+              <a:rPr lang="tr-TR" dirty="0" err="1" smtClean="0">
+                <a:solidFill>
+                  <a:srgbClr val="002060"/>
+                </a:solidFill>
+              </a:rPr>
+              <a:t>to</a:t>
+            </a:r>
+            <a:r>
+              <a:rPr lang="tr-TR" dirty="0" smtClean="0">
+                <a:solidFill>
+                  <a:srgbClr val="002060"/>
+                </a:solidFill>
+              </a:rPr>
+              <a:t> </a:t>
+            </a:r>
+            <a:r>
+              <a:rPr lang="tr-TR" b="1" dirty="0" err="1" smtClean="0">
+                <a:solidFill>
+                  <a:srgbClr val="002060"/>
+                </a:solidFill>
+              </a:rPr>
+              <a:t>being</a:t>
+            </a:r>
+            <a:r>
+              <a:rPr lang="tr-TR" b="1" dirty="0" smtClean="0">
+                <a:solidFill>
+                  <a:srgbClr val="002060"/>
+                </a:solidFill>
+              </a:rPr>
+              <a:t> </a:t>
+            </a:r>
+            <a:r>
+              <a:rPr lang="tr-TR" b="1" dirty="0" err="1" smtClean="0">
+                <a:solidFill>
+                  <a:srgbClr val="002060"/>
+                </a:solidFill>
+              </a:rPr>
+              <a:t>low</a:t>
+            </a:r>
+            <a:r>
+              <a:rPr lang="tr-TR" b="1" dirty="0" smtClean="0">
+                <a:solidFill>
+                  <a:srgbClr val="002060"/>
+                </a:solidFill>
+              </a:rPr>
+              <a:t> </a:t>
+            </a:r>
+            <a:r>
+              <a:rPr lang="tr-TR" b="1" dirty="0" err="1" smtClean="0">
+                <a:solidFill>
+                  <a:srgbClr val="002060"/>
+                </a:solidFill>
+              </a:rPr>
+              <a:t>order</a:t>
+            </a:r>
+            <a:endParaRPr lang="tr-TR" b="1" dirty="0" smtClean="0">
+              <a:solidFill>
+                <a:srgbClr val="002060"/>
+              </a:solidFill>
+            </a:endParaRPr>
+          </a:p>
+          <a:p>
+            <a:pPr marL="285750" indent="-285750">
+              <a:buFont typeface="Wingdings" panose="05000000000000000000" pitchFamily="2" charset="2"/>
+              <a:buChar char="§"/>
+            </a:pPr>
+            <a:r>
+              <a:rPr lang="en-US" dirty="0">
+                <a:solidFill>
+                  <a:srgbClr val="002060"/>
+                </a:solidFill>
+              </a:rPr>
+              <a:t>Another consequence of MMF subharmonics is an </a:t>
+            </a:r>
+            <a:r>
+              <a:rPr lang="en-US" b="1" dirty="0">
+                <a:solidFill>
+                  <a:srgbClr val="002060"/>
+                </a:solidFill>
+              </a:rPr>
+              <a:t>unbalanced saturation </a:t>
+            </a:r>
+            <a:r>
+              <a:rPr lang="en-US" dirty="0">
+                <a:solidFill>
+                  <a:srgbClr val="002060"/>
+                </a:solidFill>
+              </a:rPr>
+              <a:t>of the iron parts among the rotor poles.</a:t>
+            </a:r>
+            <a:r>
+              <a:rPr lang="tr-TR" dirty="0" smtClean="0">
+                <a:solidFill>
+                  <a:srgbClr val="002060"/>
+                </a:solidFill>
+              </a:rPr>
+              <a:t> </a:t>
+            </a:r>
+          </a:p>
+          <a:p>
+            <a:pPr marL="285750" indent="-285750">
+              <a:buFont typeface="Wingdings" panose="05000000000000000000" pitchFamily="2" charset="2"/>
+              <a:buChar char="§"/>
+            </a:pPr>
+            <a:r>
+              <a:rPr lang="en-US" dirty="0">
+                <a:solidFill>
+                  <a:srgbClr val="002060"/>
+                </a:solidFill>
+              </a:rPr>
+              <a:t>MMF subharmonics lead to low order </a:t>
+            </a:r>
+            <a:r>
+              <a:rPr lang="en-US" b="1" dirty="0">
+                <a:solidFill>
+                  <a:srgbClr val="002060"/>
+                </a:solidFill>
+              </a:rPr>
+              <a:t>radial forces </a:t>
+            </a:r>
+            <a:r>
+              <a:rPr lang="en-US" dirty="0">
+                <a:solidFill>
+                  <a:srgbClr val="002060"/>
+                </a:solidFill>
+              </a:rPr>
+              <a:t>between the rotor and the stator of the machine</a:t>
+            </a:r>
+            <a:r>
+              <a:rPr lang="en-US" dirty="0" smtClean="0">
+                <a:solidFill>
+                  <a:srgbClr val="002060"/>
+                </a:solidFill>
+              </a:rPr>
+              <a:t>.</a:t>
+            </a:r>
+            <a:endParaRPr lang="tr-TR" dirty="0" smtClean="0">
+              <a:solidFill>
+                <a:srgbClr val="002060"/>
+              </a:solidFill>
+            </a:endParaRPr>
+          </a:p>
+        </p:txBody>
+      </p:sp>
+    </p:spTree>
+    <p:extLst>
+      <p:ext uri="{BB962C8B-B14F-4D97-AF65-F5344CB8AC3E}">
+        <p14:creationId xmlns:p14="http://schemas.microsoft.com/office/powerpoint/2010/main" val="327505862"/>
+      </p:ext>
+    </p:extLst>
+  </p:cSld>
+  <p:clrMapOvr>
+    <a:masterClrMapping/>
+  </p:clrMapOvr>
+  <p:timing>
+    <p:tnLst>
+      <p:par>
+        <p:cTn id="1" dur="indefinite" restart="never" nodeType="tmRoot"/>
+      </p:par>
+    </p:tnLst>
+  </p:timing>
+</p:sld>
+</file>
+
+<file path=ppt/slides/slide63.xml><?xml version="1.0" encoding="utf-8"?>
+<p:sld xmlns:a="http://schemas.openxmlformats.org/drawingml/2006/main" xmlns:r="http://schemas.openxmlformats.org/officeDocument/2006/relationships" xmlns:p="http://schemas.openxmlformats.org/presentationml/2006/main">
+  <p:cSld>
+    <p:spTree>
+      <p:nvGrpSpPr>
+        <p:cNvPr id="1" name=""/>
+        <p:cNvGrpSpPr/>
+        <p:nvPr/>
+      </p:nvGrpSpPr>
+      <p:grpSpPr>
+        <a:xfrm>
+          <a:off x="0" y="0"/>
+          <a:ext cx="0" cy="0"/>
+          <a:chOff x="0" y="0"/>
+          <a:chExt cx="0" cy="0"/>
+        </a:xfrm>
+      </p:grpSpPr>
+      <p:sp>
+        <p:nvSpPr>
+          <p:cNvPr id="8" name="Rectangle 7"/>
+          <p:cNvSpPr/>
+          <p:nvPr/>
+        </p:nvSpPr>
+        <p:spPr>
+          <a:xfrm>
+            <a:off x="478970" y="150669"/>
+            <a:ext cx="8207829" cy="523220"/>
+          </a:xfrm>
+          <a:prstGeom prst="rect">
+            <a:avLst/>
+          </a:prstGeom>
+        </p:spPr>
+        <p:txBody>
+          <a:bodyPr wrap="square">
+            <a:spAutoFit/>
+          </a:bodyPr>
+          <a:lstStyle/>
+          <a:p>
+            <a:pPr algn="ctr"/>
+            <a:r>
+              <a:rPr lang="tr-TR" sz="2800" b="1" dirty="0" err="1" smtClean="0">
+                <a:solidFill>
+                  <a:schemeClr val="accent1">
+                    <a:lumMod val="50000"/>
+                  </a:schemeClr>
+                </a:solidFill>
+                <a:cs typeface="Arial" panose="020B0604020202020204" pitchFamily="34" charset="0"/>
+              </a:rPr>
+              <a:t>Fractional</a:t>
+            </a:r>
+            <a:r>
+              <a:rPr lang="tr-TR" sz="2800" b="1" dirty="0" smtClean="0">
+                <a:solidFill>
+                  <a:schemeClr val="accent1">
+                    <a:lumMod val="50000"/>
+                  </a:schemeClr>
+                </a:solidFill>
+                <a:cs typeface="Arial" panose="020B0604020202020204" pitchFamily="34" charset="0"/>
+              </a:rPr>
+              <a:t> </a:t>
+            </a:r>
+            <a:r>
+              <a:rPr lang="tr-TR" sz="2800" b="1" dirty="0" err="1" smtClean="0">
+                <a:solidFill>
+                  <a:schemeClr val="accent1">
+                    <a:lumMod val="50000"/>
+                  </a:schemeClr>
+                </a:solidFill>
+                <a:cs typeface="Arial" panose="020B0604020202020204" pitchFamily="34" charset="0"/>
+              </a:rPr>
+              <a:t>Slot</a:t>
+            </a:r>
+            <a:r>
+              <a:rPr lang="tr-TR" sz="2800" b="1" dirty="0" smtClean="0">
+                <a:solidFill>
+                  <a:schemeClr val="accent1">
+                    <a:lumMod val="50000"/>
+                  </a:schemeClr>
+                </a:solidFill>
+                <a:cs typeface="Arial" panose="020B0604020202020204" pitchFamily="34" charset="0"/>
+              </a:rPr>
+              <a:t> </a:t>
+            </a:r>
+            <a:r>
+              <a:rPr lang="tr-TR" sz="2800" b="1" dirty="0" err="1" smtClean="0">
+                <a:solidFill>
+                  <a:schemeClr val="accent1">
+                    <a:lumMod val="50000"/>
+                  </a:schemeClr>
+                </a:solidFill>
+                <a:cs typeface="Arial" panose="020B0604020202020204" pitchFamily="34" charset="0"/>
+              </a:rPr>
+              <a:t>Concentrated</a:t>
+            </a:r>
+            <a:r>
+              <a:rPr lang="tr-TR" sz="2800" b="1" dirty="0" smtClean="0">
+                <a:solidFill>
+                  <a:schemeClr val="accent1">
+                    <a:lumMod val="50000"/>
+                  </a:schemeClr>
+                </a:solidFill>
+                <a:cs typeface="Arial" panose="020B0604020202020204" pitchFamily="34" charset="0"/>
+              </a:rPr>
+              <a:t> </a:t>
+            </a:r>
+            <a:r>
+              <a:rPr lang="tr-TR" sz="2800" b="1" dirty="0" err="1" smtClean="0">
+                <a:solidFill>
+                  <a:schemeClr val="accent1">
+                    <a:lumMod val="50000"/>
+                  </a:schemeClr>
+                </a:solidFill>
+                <a:cs typeface="Arial" panose="020B0604020202020204" pitchFamily="34" charset="0"/>
+              </a:rPr>
+              <a:t>Winding</a:t>
+            </a:r>
+            <a:r>
+              <a:rPr lang="tr-TR" sz="2800" b="1" dirty="0" smtClean="0">
+                <a:solidFill>
+                  <a:schemeClr val="accent1">
+                    <a:lumMod val="50000"/>
+                  </a:schemeClr>
+                </a:solidFill>
+                <a:cs typeface="Arial" panose="020B0604020202020204" pitchFamily="34" charset="0"/>
+              </a:rPr>
+              <a:t> </a:t>
+            </a:r>
+            <a:r>
+              <a:rPr lang="tr-TR" sz="2800" b="1" dirty="0" err="1" smtClean="0">
+                <a:solidFill>
+                  <a:schemeClr val="accent1">
+                    <a:lumMod val="50000"/>
+                  </a:schemeClr>
+                </a:solidFill>
+                <a:cs typeface="Arial" panose="020B0604020202020204" pitchFamily="34" charset="0"/>
+              </a:rPr>
+              <a:t>Machines</a:t>
+            </a:r>
+            <a:endParaRPr lang="en-US" sz="2800" dirty="0">
+              <a:solidFill>
+                <a:schemeClr val="accent1">
+                  <a:lumMod val="50000"/>
+                </a:schemeClr>
+              </a:solidFill>
+              <a:cs typeface="Arial" panose="020B0604020202020204" pitchFamily="34" charset="0"/>
+            </a:endParaRPr>
+          </a:p>
+        </p:txBody>
+      </p:sp>
+      <p:sp>
+        <p:nvSpPr>
+          <p:cNvPr id="6" name="Rectangle 5"/>
+          <p:cNvSpPr/>
+          <p:nvPr/>
+        </p:nvSpPr>
+        <p:spPr>
+          <a:xfrm>
+            <a:off x="333702" y="673889"/>
+            <a:ext cx="8744983" cy="400110"/>
+          </a:xfrm>
+          <a:prstGeom prst="rect">
+            <a:avLst/>
+          </a:prstGeom>
+        </p:spPr>
+        <p:txBody>
+          <a:bodyPr wrap="square">
+            <a:spAutoFit/>
+          </a:bodyPr>
+          <a:lstStyle/>
+          <a:p>
+            <a:pPr algn="ctr"/>
+            <a:r>
+              <a:rPr lang="tr-TR" sz="2000" b="1" dirty="0" smtClean="0">
+                <a:solidFill>
+                  <a:srgbClr val="002060"/>
+                </a:solidFill>
+                <a:cs typeface="Arial" panose="020B0604020202020204" pitchFamily="34" charset="0"/>
+              </a:rPr>
+              <a:t>MMF </a:t>
+            </a:r>
+            <a:r>
+              <a:rPr lang="tr-TR" sz="2000" b="1" dirty="0" err="1" smtClean="0">
+                <a:solidFill>
+                  <a:srgbClr val="002060"/>
+                </a:solidFill>
+                <a:cs typeface="Arial" panose="020B0604020202020204" pitchFamily="34" charset="0"/>
+              </a:rPr>
+              <a:t>sub-harmonics</a:t>
+            </a:r>
+            <a:endParaRPr lang="tr-TR" sz="2000" b="1" dirty="0" smtClean="0">
+              <a:solidFill>
+                <a:srgbClr val="002060"/>
+              </a:solidFill>
+              <a:cs typeface="Arial" panose="020B0604020202020204" pitchFamily="34" charset="0"/>
+            </a:endParaRPr>
+          </a:p>
+        </p:txBody>
+      </p:sp>
+      <p:sp>
+        <p:nvSpPr>
+          <p:cNvPr id="10" name="Rectangle 9"/>
+          <p:cNvSpPr/>
+          <p:nvPr/>
+        </p:nvSpPr>
+        <p:spPr>
+          <a:xfrm>
+            <a:off x="333702" y="1063224"/>
+            <a:ext cx="8426577" cy="1200329"/>
+          </a:xfrm>
+          <a:prstGeom prst="rect">
+            <a:avLst/>
+          </a:prstGeom>
+        </p:spPr>
+        <p:txBody>
+          <a:bodyPr wrap="square">
+            <a:spAutoFit/>
+          </a:bodyPr>
+          <a:lstStyle/>
+          <a:p>
+            <a:pPr marL="285750" indent="-285750">
+              <a:buFont typeface="Wingdings" panose="05000000000000000000" pitchFamily="2" charset="2"/>
+              <a:buChar char="§"/>
+            </a:pPr>
+            <a:r>
+              <a:rPr lang="en-US" dirty="0">
+                <a:solidFill>
+                  <a:srgbClr val="002060"/>
+                </a:solidFill>
+              </a:rPr>
+              <a:t>MMF subharmonics are those with harmonic order </a:t>
+            </a:r>
+            <a:r>
+              <a:rPr lang="en-US" b="1" dirty="0">
+                <a:solidFill>
+                  <a:srgbClr val="002060"/>
+                </a:solidFill>
+              </a:rPr>
+              <a:t>ν &lt; p</a:t>
+            </a:r>
+            <a:r>
+              <a:rPr lang="en-US" b="1" dirty="0" smtClean="0">
+                <a:solidFill>
+                  <a:srgbClr val="002060"/>
+                </a:solidFill>
+              </a:rPr>
+              <a:t>.</a:t>
+            </a:r>
+            <a:endParaRPr lang="tr-TR" b="1" dirty="0" smtClean="0">
+              <a:solidFill>
+                <a:srgbClr val="002060"/>
+              </a:solidFill>
+            </a:endParaRPr>
+          </a:p>
+          <a:p>
+            <a:pPr marL="285750" indent="-285750">
+              <a:buFont typeface="Wingdings" panose="05000000000000000000" pitchFamily="2" charset="2"/>
+              <a:buChar char="§"/>
+            </a:pPr>
+            <a:r>
+              <a:rPr lang="en-US" b="1" dirty="0">
+                <a:solidFill>
+                  <a:srgbClr val="002060"/>
+                </a:solidFill>
+              </a:rPr>
+              <a:t>Almost all FSCWs</a:t>
+            </a:r>
+            <a:r>
+              <a:rPr lang="en-US" dirty="0">
+                <a:solidFill>
+                  <a:srgbClr val="002060"/>
+                </a:solidFill>
+              </a:rPr>
+              <a:t>, except those with q = 1/2, lead to armature MMF </a:t>
+            </a:r>
+            <a:r>
+              <a:rPr lang="en-US" dirty="0" smtClean="0">
+                <a:solidFill>
+                  <a:srgbClr val="002060"/>
+                </a:solidFill>
+              </a:rPr>
+              <a:t>subharmonics</a:t>
+            </a:r>
+            <a:endParaRPr lang="tr-TR" dirty="0" smtClean="0">
+              <a:solidFill>
+                <a:srgbClr val="002060"/>
+              </a:solidFill>
+            </a:endParaRPr>
+          </a:p>
+          <a:p>
+            <a:pPr marL="285750" indent="-285750">
+              <a:buFont typeface="Wingdings" panose="05000000000000000000" pitchFamily="2" charset="2"/>
+              <a:buChar char="§"/>
+            </a:pPr>
+            <a:r>
+              <a:rPr lang="tr-TR" dirty="0" smtClean="0">
+                <a:solidFill>
+                  <a:srgbClr val="002060"/>
+                </a:solidFill>
+              </a:rPr>
+              <a:t>T</a:t>
+            </a:r>
+            <a:r>
+              <a:rPr lang="en-US" dirty="0" smtClean="0">
+                <a:solidFill>
+                  <a:srgbClr val="002060"/>
+                </a:solidFill>
+              </a:rPr>
+              <a:t>he </a:t>
+            </a:r>
+            <a:r>
+              <a:rPr lang="en-US" dirty="0">
+                <a:solidFill>
+                  <a:srgbClr val="002060"/>
+                </a:solidFill>
+              </a:rPr>
+              <a:t>lower the </a:t>
+            </a:r>
+            <a:r>
+              <a:rPr lang="en-US" b="1" dirty="0">
+                <a:solidFill>
+                  <a:srgbClr val="002060"/>
+                </a:solidFill>
+              </a:rPr>
+              <a:t>number of layers </a:t>
+            </a:r>
+            <a:r>
+              <a:rPr lang="en-US" dirty="0">
+                <a:solidFill>
+                  <a:srgbClr val="002060"/>
+                </a:solidFill>
+              </a:rPr>
+              <a:t>for a particular combination, the higher the MMF subharmonic content</a:t>
+            </a:r>
+            <a:r>
+              <a:rPr lang="en-US" dirty="0" smtClean="0">
+                <a:solidFill>
+                  <a:srgbClr val="002060"/>
+                </a:solidFill>
+              </a:rPr>
+              <a:t>.</a:t>
+            </a:r>
+            <a:endParaRPr lang="tr-TR" dirty="0" smtClean="0">
+              <a:solidFill>
+                <a:srgbClr val="002060"/>
+              </a:solidFill>
+            </a:endParaRPr>
+          </a:p>
+        </p:txBody>
+      </p:sp>
+      <p:pic>
+        <p:nvPicPr>
+          <p:cNvPr id="9" name="Picture 8"/>
+          <p:cNvPicPr>
+            <a:picLocks noChangeAspect="1"/>
+          </p:cNvPicPr>
+          <p:nvPr/>
+        </p:nvPicPr>
+        <p:blipFill>
+          <a:blip r:embed="rId3"/>
+          <a:stretch>
+            <a:fillRect/>
+          </a:stretch>
+        </p:blipFill>
+        <p:spPr>
+          <a:xfrm>
+            <a:off x="458966" y="2416665"/>
+            <a:ext cx="8176048" cy="2506399"/>
+          </a:xfrm>
+          <a:prstGeom prst="rect">
+            <a:avLst/>
+          </a:prstGeom>
+        </p:spPr>
+      </p:pic>
+      <p:cxnSp>
+        <p:nvCxnSpPr>
+          <p:cNvPr id="12" name="Straight Arrow Connector 11"/>
+          <p:cNvCxnSpPr/>
+          <p:nvPr/>
+        </p:nvCxnSpPr>
+        <p:spPr>
+          <a:xfrm flipV="1">
+            <a:off x="1191985" y="2894275"/>
+            <a:ext cx="1967594" cy="1"/>
+          </a:xfrm>
+          <a:prstGeom prst="straightConnector1">
+            <a:avLst/>
+          </a:prstGeom>
+          <a:ln w="19050">
+            <a:solidFill>
+              <a:srgbClr val="FF0000"/>
+            </a:solidFill>
+            <a:tailEnd type="triangle"/>
+          </a:ln>
+        </p:spPr>
+        <p:style>
+          <a:lnRef idx="1">
+            <a:schemeClr val="accent1"/>
+          </a:lnRef>
+          <a:fillRef idx="0">
+            <a:schemeClr val="accent1"/>
+          </a:fillRef>
+          <a:effectRef idx="0">
+            <a:schemeClr val="accent1"/>
+          </a:effectRef>
+          <a:fontRef idx="minor">
+            <a:schemeClr val="tx1"/>
+          </a:fontRef>
+        </p:style>
+      </p:cxnSp>
+      <p:sp>
+        <p:nvSpPr>
+          <p:cNvPr id="13" name="Rectangle 12"/>
+          <p:cNvSpPr/>
+          <p:nvPr/>
+        </p:nvSpPr>
+        <p:spPr>
+          <a:xfrm>
+            <a:off x="2860182" y="2787075"/>
+            <a:ext cx="1964871" cy="584775"/>
+          </a:xfrm>
+          <a:prstGeom prst="rect">
+            <a:avLst/>
+          </a:prstGeom>
+        </p:spPr>
+        <p:txBody>
+          <a:bodyPr wrap="square">
+            <a:spAutoFit/>
+          </a:bodyPr>
+          <a:lstStyle/>
+          <a:p>
+            <a:pPr algn="ctr"/>
+            <a:r>
+              <a:rPr lang="tr-TR" sz="1600" dirty="0" err="1" smtClean="0">
+                <a:solidFill>
+                  <a:srgbClr val="C00000"/>
+                </a:solidFill>
+                <a:cs typeface="Arial" panose="020B0604020202020204" pitchFamily="34" charset="0"/>
+              </a:rPr>
+              <a:t>Sub-harmonic</a:t>
+            </a:r>
+            <a:r>
+              <a:rPr lang="tr-TR" sz="1600" dirty="0" smtClean="0">
+                <a:solidFill>
+                  <a:srgbClr val="C00000"/>
+                </a:solidFill>
+                <a:cs typeface="Arial" panose="020B0604020202020204" pitchFamily="34" charset="0"/>
+              </a:rPr>
+              <a:t>:</a:t>
+            </a:r>
+          </a:p>
+          <a:p>
+            <a:pPr algn="ctr"/>
+            <a:r>
+              <a:rPr lang="tr-TR" sz="1600" dirty="0" smtClean="0">
+                <a:solidFill>
+                  <a:srgbClr val="C00000"/>
+                </a:solidFill>
+                <a:cs typeface="Arial" panose="020B0604020202020204" pitchFamily="34" charset="0"/>
+              </a:rPr>
+              <a:t>Baya </a:t>
+            </a:r>
+            <a:r>
+              <a:rPr lang="tr-TR" sz="1600" dirty="0" err="1" smtClean="0">
+                <a:solidFill>
+                  <a:srgbClr val="C00000"/>
+                </a:solidFill>
+                <a:cs typeface="Arial" panose="020B0604020202020204" pitchFamily="34" charset="0"/>
+              </a:rPr>
+              <a:t>farkediyor</a:t>
+            </a:r>
+            <a:endParaRPr lang="tr-TR" sz="1600" dirty="0" smtClean="0">
+              <a:solidFill>
+                <a:srgbClr val="C00000"/>
+              </a:solidFill>
+              <a:cs typeface="Arial" panose="020B0604020202020204" pitchFamily="34" charset="0"/>
+            </a:endParaRPr>
+          </a:p>
+        </p:txBody>
+      </p:sp>
+      <p:cxnSp>
+        <p:nvCxnSpPr>
+          <p:cNvPr id="14" name="Straight Arrow Connector 13"/>
+          <p:cNvCxnSpPr/>
+          <p:nvPr/>
+        </p:nvCxnSpPr>
+        <p:spPr>
+          <a:xfrm flipH="1" flipV="1">
+            <a:off x="4098471" y="3371850"/>
+            <a:ext cx="1205593" cy="801499"/>
+          </a:xfrm>
+          <a:prstGeom prst="straightConnector1">
+            <a:avLst/>
+          </a:prstGeom>
+          <a:ln w="19050">
+            <a:solidFill>
+              <a:srgbClr val="FF0000"/>
+            </a:solidFill>
+            <a:tailEnd type="triangle"/>
+          </a:ln>
+        </p:spPr>
+        <p:style>
+          <a:lnRef idx="1">
+            <a:schemeClr val="accent1"/>
+          </a:lnRef>
+          <a:fillRef idx="0">
+            <a:schemeClr val="accent1"/>
+          </a:fillRef>
+          <a:effectRef idx="0">
+            <a:schemeClr val="accent1"/>
+          </a:effectRef>
+          <a:fontRef idx="minor">
+            <a:schemeClr val="tx1"/>
+          </a:fontRef>
+        </p:style>
+      </p:cxnSp>
+      <p:sp>
+        <p:nvSpPr>
+          <p:cNvPr id="15" name="Rectangle 14"/>
+          <p:cNvSpPr/>
+          <p:nvPr/>
+        </p:nvSpPr>
+        <p:spPr>
+          <a:xfrm>
+            <a:off x="3718831" y="4584510"/>
+            <a:ext cx="1964871" cy="338554"/>
+          </a:xfrm>
+          <a:prstGeom prst="rect">
+            <a:avLst/>
+          </a:prstGeom>
+        </p:spPr>
+        <p:txBody>
+          <a:bodyPr wrap="square">
+            <a:spAutoFit/>
+          </a:bodyPr>
+          <a:lstStyle/>
+          <a:p>
+            <a:pPr algn="ctr"/>
+            <a:r>
+              <a:rPr lang="tr-TR" sz="1600" dirty="0" smtClean="0">
+                <a:solidFill>
+                  <a:srgbClr val="002060"/>
+                </a:solidFill>
+                <a:cs typeface="Arial" panose="020B0604020202020204" pitchFamily="34" charset="0"/>
+              </a:rPr>
+              <a:t>p = 5</a:t>
+            </a:r>
+          </a:p>
+        </p:txBody>
+      </p:sp>
+      <p:sp>
+        <p:nvSpPr>
+          <p:cNvPr id="16" name="Rectangle 15"/>
+          <p:cNvSpPr/>
+          <p:nvPr/>
+        </p:nvSpPr>
+        <p:spPr>
+          <a:xfrm>
+            <a:off x="333701" y="4939530"/>
+            <a:ext cx="8426577" cy="1477328"/>
+          </a:xfrm>
+          <a:prstGeom prst="rect">
+            <a:avLst/>
+          </a:prstGeom>
+        </p:spPr>
+        <p:txBody>
+          <a:bodyPr wrap="square">
+            <a:spAutoFit/>
+          </a:bodyPr>
+          <a:lstStyle/>
+          <a:p>
+            <a:pPr marL="285750" indent="-285750">
+              <a:buFont typeface="Wingdings" panose="05000000000000000000" pitchFamily="2" charset="2"/>
+              <a:buChar char="§"/>
+            </a:pPr>
+            <a:r>
+              <a:rPr lang="tr-TR" dirty="0" err="1" smtClean="0">
+                <a:solidFill>
+                  <a:srgbClr val="002060"/>
+                </a:solidFill>
+              </a:rPr>
+              <a:t>Have</a:t>
+            </a:r>
+            <a:r>
+              <a:rPr lang="tr-TR" dirty="0" smtClean="0">
+                <a:solidFill>
+                  <a:srgbClr val="002060"/>
+                </a:solidFill>
+              </a:rPr>
+              <a:t> </a:t>
+            </a:r>
+            <a:r>
+              <a:rPr lang="tr-TR" dirty="0" err="1" smtClean="0">
+                <a:solidFill>
+                  <a:srgbClr val="002060"/>
+                </a:solidFill>
+              </a:rPr>
+              <a:t>more</a:t>
+            </a:r>
+            <a:r>
+              <a:rPr lang="tr-TR" dirty="0" smtClean="0">
+                <a:solidFill>
+                  <a:srgbClr val="002060"/>
+                </a:solidFill>
+              </a:rPr>
+              <a:t> </a:t>
+            </a:r>
+            <a:r>
+              <a:rPr lang="tr-TR" dirty="0" err="1" smtClean="0">
+                <a:solidFill>
+                  <a:srgbClr val="002060"/>
+                </a:solidFill>
+              </a:rPr>
+              <a:t>adverse</a:t>
+            </a:r>
+            <a:r>
+              <a:rPr lang="tr-TR" dirty="0" smtClean="0">
+                <a:solidFill>
+                  <a:srgbClr val="002060"/>
+                </a:solidFill>
+              </a:rPr>
+              <a:t> </a:t>
+            </a:r>
+            <a:r>
+              <a:rPr lang="tr-TR" dirty="0" err="1" smtClean="0">
+                <a:solidFill>
+                  <a:srgbClr val="002060"/>
+                </a:solidFill>
+              </a:rPr>
+              <a:t>effect</a:t>
+            </a:r>
+            <a:r>
+              <a:rPr lang="tr-TR" dirty="0" smtClean="0">
+                <a:solidFill>
+                  <a:srgbClr val="002060"/>
+                </a:solidFill>
+              </a:rPr>
+              <a:t> on rotor </a:t>
+            </a:r>
+            <a:r>
+              <a:rPr lang="tr-TR" dirty="0" err="1" smtClean="0">
+                <a:solidFill>
+                  <a:srgbClr val="002060"/>
+                </a:solidFill>
+              </a:rPr>
+              <a:t>losses</a:t>
+            </a:r>
+            <a:r>
+              <a:rPr lang="tr-TR" dirty="0" smtClean="0">
+                <a:solidFill>
+                  <a:srgbClr val="002060"/>
+                </a:solidFill>
+              </a:rPr>
+              <a:t> </a:t>
+            </a:r>
+            <a:r>
+              <a:rPr lang="tr-TR" dirty="0" err="1" smtClean="0">
+                <a:solidFill>
+                  <a:srgbClr val="002060"/>
+                </a:solidFill>
+              </a:rPr>
+              <a:t>due</a:t>
+            </a:r>
+            <a:r>
+              <a:rPr lang="tr-TR" dirty="0" smtClean="0">
+                <a:solidFill>
+                  <a:srgbClr val="002060"/>
+                </a:solidFill>
+              </a:rPr>
+              <a:t> </a:t>
+            </a:r>
+            <a:r>
+              <a:rPr lang="tr-TR" dirty="0" err="1" smtClean="0">
+                <a:solidFill>
+                  <a:srgbClr val="002060"/>
+                </a:solidFill>
+              </a:rPr>
+              <a:t>to</a:t>
+            </a:r>
+            <a:r>
+              <a:rPr lang="tr-TR" dirty="0" smtClean="0">
+                <a:solidFill>
+                  <a:srgbClr val="002060"/>
+                </a:solidFill>
+              </a:rPr>
+              <a:t> </a:t>
+            </a:r>
+            <a:r>
+              <a:rPr lang="tr-TR" b="1" dirty="0" err="1" smtClean="0">
+                <a:solidFill>
+                  <a:srgbClr val="002060"/>
+                </a:solidFill>
+              </a:rPr>
+              <a:t>being</a:t>
+            </a:r>
+            <a:r>
+              <a:rPr lang="tr-TR" b="1" dirty="0" smtClean="0">
+                <a:solidFill>
+                  <a:srgbClr val="002060"/>
+                </a:solidFill>
+              </a:rPr>
+              <a:t> </a:t>
+            </a:r>
+            <a:r>
+              <a:rPr lang="tr-TR" b="1" dirty="0" err="1" smtClean="0">
+                <a:solidFill>
+                  <a:srgbClr val="002060"/>
+                </a:solidFill>
+              </a:rPr>
+              <a:t>low</a:t>
+            </a:r>
+            <a:r>
+              <a:rPr lang="tr-TR" b="1" dirty="0" smtClean="0">
+                <a:solidFill>
+                  <a:srgbClr val="002060"/>
+                </a:solidFill>
+              </a:rPr>
+              <a:t> </a:t>
+            </a:r>
+            <a:r>
+              <a:rPr lang="tr-TR" b="1" dirty="0" err="1" smtClean="0">
+                <a:solidFill>
+                  <a:srgbClr val="002060"/>
+                </a:solidFill>
+              </a:rPr>
+              <a:t>order</a:t>
+            </a:r>
+            <a:endParaRPr lang="tr-TR" b="1" dirty="0" smtClean="0">
+              <a:solidFill>
+                <a:srgbClr val="002060"/>
+              </a:solidFill>
+            </a:endParaRPr>
+          </a:p>
+          <a:p>
+            <a:pPr marL="285750" indent="-285750">
+              <a:buFont typeface="Wingdings" panose="05000000000000000000" pitchFamily="2" charset="2"/>
+              <a:buChar char="§"/>
+            </a:pPr>
+            <a:r>
+              <a:rPr lang="en-US" dirty="0">
+                <a:solidFill>
+                  <a:srgbClr val="002060"/>
+                </a:solidFill>
+              </a:rPr>
+              <a:t>Another consequence of MMF subharmonics is an </a:t>
+            </a:r>
+            <a:r>
+              <a:rPr lang="en-US" b="1" dirty="0">
+                <a:solidFill>
+                  <a:srgbClr val="002060"/>
+                </a:solidFill>
+              </a:rPr>
+              <a:t>unbalanced saturation </a:t>
+            </a:r>
+            <a:r>
+              <a:rPr lang="en-US" dirty="0">
+                <a:solidFill>
+                  <a:srgbClr val="002060"/>
+                </a:solidFill>
+              </a:rPr>
+              <a:t>of the iron parts among the rotor poles.</a:t>
+            </a:r>
+            <a:r>
+              <a:rPr lang="tr-TR" dirty="0" smtClean="0">
+                <a:solidFill>
+                  <a:srgbClr val="002060"/>
+                </a:solidFill>
+              </a:rPr>
+              <a:t> </a:t>
+            </a:r>
+          </a:p>
+          <a:p>
+            <a:pPr marL="285750" indent="-285750">
+              <a:buFont typeface="Wingdings" panose="05000000000000000000" pitchFamily="2" charset="2"/>
+              <a:buChar char="§"/>
+            </a:pPr>
+            <a:r>
+              <a:rPr lang="en-US" dirty="0">
+                <a:solidFill>
+                  <a:srgbClr val="002060"/>
+                </a:solidFill>
+              </a:rPr>
+              <a:t>MMF subharmonics lead to low order </a:t>
+            </a:r>
+            <a:r>
+              <a:rPr lang="en-US" b="1" dirty="0">
+                <a:solidFill>
+                  <a:srgbClr val="002060"/>
+                </a:solidFill>
+              </a:rPr>
+              <a:t>radial forces </a:t>
+            </a:r>
+            <a:r>
+              <a:rPr lang="en-US" dirty="0">
+                <a:solidFill>
+                  <a:srgbClr val="002060"/>
+                </a:solidFill>
+              </a:rPr>
+              <a:t>between the rotor and the stator of the machine</a:t>
+            </a:r>
+            <a:r>
+              <a:rPr lang="en-US" dirty="0" smtClean="0">
+                <a:solidFill>
+                  <a:srgbClr val="002060"/>
+                </a:solidFill>
+              </a:rPr>
+              <a:t>.</a:t>
+            </a:r>
+            <a:endParaRPr lang="tr-TR" dirty="0" smtClean="0">
+              <a:solidFill>
+                <a:srgbClr val="002060"/>
+              </a:solidFill>
+            </a:endParaRPr>
+          </a:p>
+        </p:txBody>
+      </p:sp>
+    </p:spTree>
+    <p:extLst>
+      <p:ext uri="{BB962C8B-B14F-4D97-AF65-F5344CB8AC3E}">
+        <p14:creationId xmlns:p14="http://schemas.microsoft.com/office/powerpoint/2010/main" val="4173466549"/>
+      </p:ext>
+    </p:extLst>
+  </p:cSld>
+  <p:clrMapOvr>
+    <a:masterClrMapping/>
+  </p:clrMapOvr>
+  <p:timing>
+    <p:tnLst>
+      <p:par>
+        <p:cTn id="1" dur="indefinite" restart="never" nodeType="tmRoot"/>
+      </p:par>
+    </p:tnLst>
+  </p:timing>
+</p:sld>
+</file>
+
+<file path=ppt/slides/slide64.xml><?xml version="1.0" encoding="utf-8"?>
+<p:sld xmlns:a="http://schemas.openxmlformats.org/drawingml/2006/main" xmlns:r="http://schemas.openxmlformats.org/officeDocument/2006/relationships" xmlns:p="http://schemas.openxmlformats.org/presentationml/2006/main">
+  <p:cSld>
+    <p:spTree>
+      <p:nvGrpSpPr>
+        <p:cNvPr id="1" name=""/>
+        <p:cNvGrpSpPr/>
+        <p:nvPr/>
+      </p:nvGrpSpPr>
+      <p:grpSpPr>
+        <a:xfrm>
+          <a:off x="0" y="0"/>
+          <a:ext cx="0" cy="0"/>
+          <a:chOff x="0" y="0"/>
+          <a:chExt cx="0" cy="0"/>
+        </a:xfrm>
+      </p:grpSpPr>
+      <p:sp>
+        <p:nvSpPr>
+          <p:cNvPr id="8" name="Rectangle 7"/>
+          <p:cNvSpPr/>
+          <p:nvPr/>
+        </p:nvSpPr>
+        <p:spPr>
+          <a:xfrm>
+            <a:off x="478970" y="150669"/>
+            <a:ext cx="8207829" cy="523220"/>
+          </a:xfrm>
+          <a:prstGeom prst="rect">
+            <a:avLst/>
+          </a:prstGeom>
+        </p:spPr>
+        <p:txBody>
+          <a:bodyPr wrap="square">
+            <a:spAutoFit/>
+          </a:bodyPr>
+          <a:lstStyle/>
+          <a:p>
+            <a:pPr algn="ctr"/>
+            <a:r>
+              <a:rPr lang="tr-TR" sz="2800" b="1" dirty="0" err="1" smtClean="0">
+                <a:solidFill>
+                  <a:schemeClr val="accent1">
+                    <a:lumMod val="50000"/>
+                  </a:schemeClr>
+                </a:solidFill>
+                <a:cs typeface="Arial" panose="020B0604020202020204" pitchFamily="34" charset="0"/>
+              </a:rPr>
+              <a:t>Fractional</a:t>
+            </a:r>
+            <a:r>
+              <a:rPr lang="tr-TR" sz="2800" b="1" dirty="0" smtClean="0">
+                <a:solidFill>
+                  <a:schemeClr val="accent1">
+                    <a:lumMod val="50000"/>
+                  </a:schemeClr>
+                </a:solidFill>
+                <a:cs typeface="Arial" panose="020B0604020202020204" pitchFamily="34" charset="0"/>
+              </a:rPr>
+              <a:t> </a:t>
+            </a:r>
+            <a:r>
+              <a:rPr lang="tr-TR" sz="2800" b="1" dirty="0" err="1" smtClean="0">
+                <a:solidFill>
+                  <a:schemeClr val="accent1">
+                    <a:lumMod val="50000"/>
+                  </a:schemeClr>
+                </a:solidFill>
+                <a:cs typeface="Arial" panose="020B0604020202020204" pitchFamily="34" charset="0"/>
+              </a:rPr>
+              <a:t>Slot</a:t>
+            </a:r>
+            <a:r>
+              <a:rPr lang="tr-TR" sz="2800" b="1" dirty="0" smtClean="0">
+                <a:solidFill>
+                  <a:schemeClr val="accent1">
+                    <a:lumMod val="50000"/>
+                  </a:schemeClr>
+                </a:solidFill>
+                <a:cs typeface="Arial" panose="020B0604020202020204" pitchFamily="34" charset="0"/>
+              </a:rPr>
+              <a:t> </a:t>
+            </a:r>
+            <a:r>
+              <a:rPr lang="tr-TR" sz="2800" b="1" dirty="0" err="1" smtClean="0">
+                <a:solidFill>
+                  <a:schemeClr val="accent1">
+                    <a:lumMod val="50000"/>
+                  </a:schemeClr>
+                </a:solidFill>
+                <a:cs typeface="Arial" panose="020B0604020202020204" pitchFamily="34" charset="0"/>
+              </a:rPr>
+              <a:t>Concentrated</a:t>
+            </a:r>
+            <a:r>
+              <a:rPr lang="tr-TR" sz="2800" b="1" dirty="0" smtClean="0">
+                <a:solidFill>
+                  <a:schemeClr val="accent1">
+                    <a:lumMod val="50000"/>
+                  </a:schemeClr>
+                </a:solidFill>
+                <a:cs typeface="Arial" panose="020B0604020202020204" pitchFamily="34" charset="0"/>
+              </a:rPr>
+              <a:t> </a:t>
+            </a:r>
+            <a:r>
+              <a:rPr lang="tr-TR" sz="2800" b="1" dirty="0" err="1" smtClean="0">
+                <a:solidFill>
+                  <a:schemeClr val="accent1">
+                    <a:lumMod val="50000"/>
+                  </a:schemeClr>
+                </a:solidFill>
+                <a:cs typeface="Arial" panose="020B0604020202020204" pitchFamily="34" charset="0"/>
+              </a:rPr>
+              <a:t>Winding</a:t>
+            </a:r>
+            <a:r>
+              <a:rPr lang="tr-TR" sz="2800" b="1" dirty="0" smtClean="0">
+                <a:solidFill>
+                  <a:schemeClr val="accent1">
+                    <a:lumMod val="50000"/>
+                  </a:schemeClr>
+                </a:solidFill>
+                <a:cs typeface="Arial" panose="020B0604020202020204" pitchFamily="34" charset="0"/>
+              </a:rPr>
+              <a:t> </a:t>
+            </a:r>
+            <a:r>
+              <a:rPr lang="tr-TR" sz="2800" b="1" dirty="0" err="1" smtClean="0">
+                <a:solidFill>
+                  <a:schemeClr val="accent1">
+                    <a:lumMod val="50000"/>
+                  </a:schemeClr>
+                </a:solidFill>
+                <a:cs typeface="Arial" panose="020B0604020202020204" pitchFamily="34" charset="0"/>
+              </a:rPr>
+              <a:t>Machines</a:t>
+            </a:r>
+            <a:endParaRPr lang="en-US" sz="2800" dirty="0">
+              <a:solidFill>
+                <a:schemeClr val="accent1">
+                  <a:lumMod val="50000"/>
+                </a:schemeClr>
+              </a:solidFill>
+              <a:cs typeface="Arial" panose="020B0604020202020204" pitchFamily="34" charset="0"/>
+            </a:endParaRPr>
+          </a:p>
+        </p:txBody>
+      </p:sp>
+      <p:sp>
+        <p:nvSpPr>
+          <p:cNvPr id="6" name="Rectangle 5"/>
+          <p:cNvSpPr/>
+          <p:nvPr/>
+        </p:nvSpPr>
+        <p:spPr>
+          <a:xfrm>
+            <a:off x="333702" y="673889"/>
+            <a:ext cx="8744983" cy="400110"/>
+          </a:xfrm>
+          <a:prstGeom prst="rect">
+            <a:avLst/>
+          </a:prstGeom>
+        </p:spPr>
+        <p:txBody>
+          <a:bodyPr wrap="square">
+            <a:spAutoFit/>
+          </a:bodyPr>
+          <a:lstStyle/>
+          <a:p>
+            <a:pPr algn="ctr"/>
+            <a:r>
+              <a:rPr lang="tr-TR" sz="2000" b="1" dirty="0" smtClean="0">
+                <a:solidFill>
+                  <a:srgbClr val="002060"/>
+                </a:solidFill>
+                <a:cs typeface="Arial" panose="020B0604020202020204" pitchFamily="34" charset="0"/>
+              </a:rPr>
+              <a:t>MMF </a:t>
+            </a:r>
+            <a:r>
+              <a:rPr lang="tr-TR" sz="2000" b="1" dirty="0" err="1" smtClean="0">
+                <a:solidFill>
+                  <a:srgbClr val="002060"/>
+                </a:solidFill>
+                <a:cs typeface="Arial" panose="020B0604020202020204" pitchFamily="34" charset="0"/>
+              </a:rPr>
+              <a:t>distribution</a:t>
+            </a:r>
+            <a:r>
+              <a:rPr lang="tr-TR" sz="2000" b="1" dirty="0" smtClean="0">
+                <a:solidFill>
+                  <a:srgbClr val="002060"/>
+                </a:solidFill>
+                <a:cs typeface="Arial" panose="020B0604020202020204" pitchFamily="34" charset="0"/>
+              </a:rPr>
+              <a:t> – </a:t>
+            </a:r>
+            <a:r>
+              <a:rPr lang="tr-TR" sz="2000" b="1" dirty="0" err="1" smtClean="0">
+                <a:solidFill>
+                  <a:srgbClr val="002060"/>
+                </a:solidFill>
+                <a:cs typeface="Arial" panose="020B0604020202020204" pitchFamily="34" charset="0"/>
+              </a:rPr>
+              <a:t>Our</a:t>
+            </a:r>
+            <a:r>
+              <a:rPr lang="tr-TR" sz="2000" b="1" dirty="0" smtClean="0">
+                <a:solidFill>
+                  <a:srgbClr val="002060"/>
+                </a:solidFill>
+                <a:cs typeface="Arial" panose="020B0604020202020204" pitchFamily="34" charset="0"/>
+              </a:rPr>
+              <a:t> </a:t>
+            </a:r>
+            <a:r>
+              <a:rPr lang="tr-TR" sz="2000" b="1" dirty="0" err="1" smtClean="0">
+                <a:solidFill>
+                  <a:srgbClr val="002060"/>
+                </a:solidFill>
+                <a:cs typeface="Arial" panose="020B0604020202020204" pitchFamily="34" charset="0"/>
+              </a:rPr>
+              <a:t>machine</a:t>
+            </a:r>
+            <a:endParaRPr lang="tr-TR" sz="2000" b="1" dirty="0" smtClean="0">
+              <a:solidFill>
+                <a:srgbClr val="002060"/>
+              </a:solidFill>
+              <a:cs typeface="Arial" panose="020B0604020202020204" pitchFamily="34" charset="0"/>
+            </a:endParaRPr>
+          </a:p>
+        </p:txBody>
+      </p:sp>
+      <p:pic>
+        <p:nvPicPr>
+          <p:cNvPr id="2" name="Picture 1"/>
+          <p:cNvPicPr>
+            <a:picLocks noChangeAspect="1"/>
+          </p:cNvPicPr>
+          <p:nvPr/>
+        </p:nvPicPr>
+        <p:blipFill rotWithShape="1">
+          <a:blip r:embed="rId3"/>
+          <a:srcRect l="6142" t="5234" r="7454" b="5949"/>
+          <a:stretch/>
+        </p:blipFill>
+        <p:spPr>
+          <a:xfrm>
+            <a:off x="1473367" y="1073999"/>
+            <a:ext cx="6465651" cy="5784001"/>
+          </a:xfrm>
+          <a:prstGeom prst="rect">
+            <a:avLst/>
+          </a:prstGeom>
+        </p:spPr>
+      </p:pic>
+    </p:spTree>
+    <p:extLst>
+      <p:ext uri="{BB962C8B-B14F-4D97-AF65-F5344CB8AC3E}">
+        <p14:creationId xmlns:p14="http://schemas.microsoft.com/office/powerpoint/2010/main" val="3368415732"/>
+      </p:ext>
+    </p:extLst>
+  </p:cSld>
+  <p:clrMapOvr>
+    <a:masterClrMapping/>
+  </p:clrMapOvr>
+  <p:timing>
+    <p:tnLst>
+      <p:par>
+        <p:cTn id="1" dur="indefinite" restart="never" nodeType="tmRoot"/>
+      </p:par>
+    </p:tnLst>
+  </p:timing>
+</p:sld>
+</file>
+
+<file path=ppt/slides/slide65.xml><?xml version="1.0" encoding="utf-8"?>
+<p:sld xmlns:a="http://schemas.openxmlformats.org/drawingml/2006/main" xmlns:r="http://schemas.openxmlformats.org/officeDocument/2006/relationships" xmlns:p="http://schemas.openxmlformats.org/presentationml/2006/main">
+  <p:cSld>
+    <p:spTree>
+      <p:nvGrpSpPr>
+        <p:cNvPr id="1" name=""/>
+        <p:cNvGrpSpPr/>
+        <p:nvPr/>
+      </p:nvGrpSpPr>
+      <p:grpSpPr>
+        <a:xfrm>
+          <a:off x="0" y="0"/>
+          <a:ext cx="0" cy="0"/>
+          <a:chOff x="0" y="0"/>
+          <a:chExt cx="0" cy="0"/>
+        </a:xfrm>
+      </p:grpSpPr>
+      <p:pic>
+        <p:nvPicPr>
+          <p:cNvPr id="5" name="Picture 4"/>
+          <p:cNvPicPr>
+            <a:picLocks noChangeAspect="1"/>
+          </p:cNvPicPr>
+          <p:nvPr/>
+        </p:nvPicPr>
+        <p:blipFill rotWithShape="1">
+          <a:blip r:embed="rId3"/>
+          <a:srcRect l="7602" t="6528" r="7224" b="3341"/>
+          <a:stretch/>
+        </p:blipFill>
+        <p:spPr>
+          <a:xfrm>
+            <a:off x="1028700" y="1349509"/>
+            <a:ext cx="6883894" cy="5419725"/>
+          </a:xfrm>
+          <a:prstGeom prst="rect">
+            <a:avLst/>
+          </a:prstGeom>
+        </p:spPr>
+      </p:pic>
+      <p:sp>
+        <p:nvSpPr>
+          <p:cNvPr id="8" name="Rectangle 7"/>
+          <p:cNvSpPr/>
+          <p:nvPr/>
+        </p:nvSpPr>
+        <p:spPr>
+          <a:xfrm>
+            <a:off x="478970" y="150669"/>
+            <a:ext cx="8207829" cy="523220"/>
+          </a:xfrm>
+          <a:prstGeom prst="rect">
+            <a:avLst/>
+          </a:prstGeom>
+        </p:spPr>
+        <p:txBody>
+          <a:bodyPr wrap="square">
+            <a:spAutoFit/>
+          </a:bodyPr>
+          <a:lstStyle/>
+          <a:p>
+            <a:pPr algn="ctr"/>
+            <a:r>
+              <a:rPr lang="tr-TR" sz="2800" b="1" dirty="0" err="1" smtClean="0">
+                <a:solidFill>
+                  <a:schemeClr val="accent1">
+                    <a:lumMod val="50000"/>
+                  </a:schemeClr>
+                </a:solidFill>
+                <a:cs typeface="Arial" panose="020B0604020202020204" pitchFamily="34" charset="0"/>
+              </a:rPr>
+              <a:t>Fractional</a:t>
+            </a:r>
+            <a:r>
+              <a:rPr lang="tr-TR" sz="2800" b="1" dirty="0" smtClean="0">
+                <a:solidFill>
+                  <a:schemeClr val="accent1">
+                    <a:lumMod val="50000"/>
+                  </a:schemeClr>
+                </a:solidFill>
+                <a:cs typeface="Arial" panose="020B0604020202020204" pitchFamily="34" charset="0"/>
+              </a:rPr>
+              <a:t> </a:t>
+            </a:r>
+            <a:r>
+              <a:rPr lang="tr-TR" sz="2800" b="1" dirty="0" err="1" smtClean="0">
+                <a:solidFill>
+                  <a:schemeClr val="accent1">
+                    <a:lumMod val="50000"/>
+                  </a:schemeClr>
+                </a:solidFill>
+                <a:cs typeface="Arial" panose="020B0604020202020204" pitchFamily="34" charset="0"/>
+              </a:rPr>
+              <a:t>Slot</a:t>
+            </a:r>
+            <a:r>
+              <a:rPr lang="tr-TR" sz="2800" b="1" dirty="0" smtClean="0">
+                <a:solidFill>
+                  <a:schemeClr val="accent1">
+                    <a:lumMod val="50000"/>
+                  </a:schemeClr>
+                </a:solidFill>
+                <a:cs typeface="Arial" panose="020B0604020202020204" pitchFamily="34" charset="0"/>
+              </a:rPr>
+              <a:t> </a:t>
+            </a:r>
+            <a:r>
+              <a:rPr lang="tr-TR" sz="2800" b="1" dirty="0" err="1" smtClean="0">
+                <a:solidFill>
+                  <a:schemeClr val="accent1">
+                    <a:lumMod val="50000"/>
+                  </a:schemeClr>
+                </a:solidFill>
+                <a:cs typeface="Arial" panose="020B0604020202020204" pitchFamily="34" charset="0"/>
+              </a:rPr>
+              <a:t>Concentrated</a:t>
+            </a:r>
+            <a:r>
+              <a:rPr lang="tr-TR" sz="2800" b="1" dirty="0" smtClean="0">
+                <a:solidFill>
+                  <a:schemeClr val="accent1">
+                    <a:lumMod val="50000"/>
+                  </a:schemeClr>
+                </a:solidFill>
+                <a:cs typeface="Arial" panose="020B0604020202020204" pitchFamily="34" charset="0"/>
+              </a:rPr>
+              <a:t> </a:t>
+            </a:r>
+            <a:r>
+              <a:rPr lang="tr-TR" sz="2800" b="1" dirty="0" err="1" smtClean="0">
+                <a:solidFill>
+                  <a:schemeClr val="accent1">
+                    <a:lumMod val="50000"/>
+                  </a:schemeClr>
+                </a:solidFill>
+                <a:cs typeface="Arial" panose="020B0604020202020204" pitchFamily="34" charset="0"/>
+              </a:rPr>
+              <a:t>Winding</a:t>
+            </a:r>
+            <a:r>
+              <a:rPr lang="tr-TR" sz="2800" b="1" dirty="0" smtClean="0">
+                <a:solidFill>
+                  <a:schemeClr val="accent1">
+                    <a:lumMod val="50000"/>
+                  </a:schemeClr>
+                </a:solidFill>
+                <a:cs typeface="Arial" panose="020B0604020202020204" pitchFamily="34" charset="0"/>
+              </a:rPr>
+              <a:t> </a:t>
+            </a:r>
+            <a:r>
+              <a:rPr lang="tr-TR" sz="2800" b="1" dirty="0" err="1" smtClean="0">
+                <a:solidFill>
+                  <a:schemeClr val="accent1">
+                    <a:lumMod val="50000"/>
+                  </a:schemeClr>
+                </a:solidFill>
+                <a:cs typeface="Arial" panose="020B0604020202020204" pitchFamily="34" charset="0"/>
+              </a:rPr>
+              <a:t>Machines</a:t>
+            </a:r>
+            <a:endParaRPr lang="en-US" sz="2800" dirty="0">
+              <a:solidFill>
+                <a:schemeClr val="accent1">
+                  <a:lumMod val="50000"/>
+                </a:schemeClr>
+              </a:solidFill>
+              <a:cs typeface="Arial" panose="020B0604020202020204" pitchFamily="34" charset="0"/>
+            </a:endParaRPr>
+          </a:p>
+        </p:txBody>
+      </p:sp>
+      <p:sp>
+        <p:nvSpPr>
+          <p:cNvPr id="6" name="Rectangle 5"/>
+          <p:cNvSpPr/>
+          <p:nvPr/>
+        </p:nvSpPr>
+        <p:spPr>
+          <a:xfrm>
+            <a:off x="333702" y="673889"/>
+            <a:ext cx="8744983" cy="400110"/>
+          </a:xfrm>
+          <a:prstGeom prst="rect">
+            <a:avLst/>
+          </a:prstGeom>
+        </p:spPr>
+        <p:txBody>
+          <a:bodyPr wrap="square">
+            <a:spAutoFit/>
+          </a:bodyPr>
+          <a:lstStyle/>
+          <a:p>
+            <a:pPr algn="ctr"/>
+            <a:r>
+              <a:rPr lang="tr-TR" sz="2000" b="1" dirty="0" smtClean="0">
+                <a:solidFill>
+                  <a:srgbClr val="002060"/>
+                </a:solidFill>
+                <a:cs typeface="Arial" panose="020B0604020202020204" pitchFamily="34" charset="0"/>
+              </a:rPr>
+              <a:t>MMF </a:t>
+            </a:r>
+            <a:r>
+              <a:rPr lang="tr-TR" sz="2000" b="1" dirty="0" err="1" smtClean="0">
+                <a:solidFill>
+                  <a:srgbClr val="002060"/>
+                </a:solidFill>
+                <a:cs typeface="Arial" panose="020B0604020202020204" pitchFamily="34" charset="0"/>
+              </a:rPr>
+              <a:t>distribution</a:t>
+            </a:r>
+            <a:r>
+              <a:rPr lang="tr-TR" sz="2000" b="1" dirty="0" smtClean="0">
+                <a:solidFill>
+                  <a:srgbClr val="002060"/>
+                </a:solidFill>
+                <a:cs typeface="Arial" panose="020B0604020202020204" pitchFamily="34" charset="0"/>
+              </a:rPr>
+              <a:t> – </a:t>
+            </a:r>
+            <a:r>
+              <a:rPr lang="tr-TR" sz="2000" b="1" dirty="0" err="1" smtClean="0">
+                <a:solidFill>
+                  <a:srgbClr val="002060"/>
+                </a:solidFill>
+                <a:cs typeface="Arial" panose="020B0604020202020204" pitchFamily="34" charset="0"/>
+              </a:rPr>
+              <a:t>Our</a:t>
+            </a:r>
+            <a:r>
+              <a:rPr lang="tr-TR" sz="2000" b="1" dirty="0" smtClean="0">
+                <a:solidFill>
+                  <a:srgbClr val="002060"/>
+                </a:solidFill>
+                <a:cs typeface="Arial" panose="020B0604020202020204" pitchFamily="34" charset="0"/>
+              </a:rPr>
+              <a:t> </a:t>
+            </a:r>
+            <a:r>
+              <a:rPr lang="tr-TR" sz="2000" b="1" dirty="0" err="1" smtClean="0">
+                <a:solidFill>
+                  <a:srgbClr val="002060"/>
+                </a:solidFill>
+                <a:cs typeface="Arial" panose="020B0604020202020204" pitchFamily="34" charset="0"/>
+              </a:rPr>
+              <a:t>machine</a:t>
+            </a:r>
+            <a:endParaRPr lang="tr-TR" sz="2000" b="1" dirty="0" smtClean="0">
+              <a:solidFill>
+                <a:srgbClr val="002060"/>
+              </a:solidFill>
+              <a:cs typeface="Arial" panose="020B0604020202020204" pitchFamily="34" charset="0"/>
+            </a:endParaRPr>
+          </a:p>
+        </p:txBody>
+      </p:sp>
+      <p:sp>
+        <p:nvSpPr>
+          <p:cNvPr id="7" name="Rectangle 6"/>
+          <p:cNvSpPr/>
+          <p:nvPr/>
+        </p:nvSpPr>
+        <p:spPr>
+          <a:xfrm>
+            <a:off x="2860182" y="1830023"/>
+            <a:ext cx="1964871" cy="338554"/>
+          </a:xfrm>
+          <a:prstGeom prst="rect">
+            <a:avLst/>
+          </a:prstGeom>
+        </p:spPr>
+        <p:txBody>
+          <a:bodyPr wrap="square">
+            <a:spAutoFit/>
+          </a:bodyPr>
+          <a:lstStyle/>
+          <a:p>
+            <a:pPr algn="ctr"/>
+            <a:r>
+              <a:rPr lang="tr-TR" sz="1600" dirty="0" err="1" smtClean="0">
+                <a:solidFill>
+                  <a:srgbClr val="C00000"/>
+                </a:solidFill>
+                <a:cs typeface="Arial" panose="020B0604020202020204" pitchFamily="34" charset="0"/>
+              </a:rPr>
+              <a:t>Fundamental</a:t>
+            </a:r>
+            <a:endParaRPr lang="tr-TR" sz="1600" dirty="0" smtClean="0">
+              <a:solidFill>
+                <a:srgbClr val="C00000"/>
+              </a:solidFill>
+              <a:cs typeface="Arial" panose="020B0604020202020204" pitchFamily="34" charset="0"/>
+            </a:endParaRPr>
+          </a:p>
+        </p:txBody>
+      </p:sp>
+      <p:cxnSp>
+        <p:nvCxnSpPr>
+          <p:cNvPr id="9" name="Straight Arrow Connector 8"/>
+          <p:cNvCxnSpPr/>
+          <p:nvPr/>
+        </p:nvCxnSpPr>
+        <p:spPr>
+          <a:xfrm flipV="1">
+            <a:off x="2092941" y="2019300"/>
+            <a:ext cx="1021734" cy="379419"/>
+          </a:xfrm>
+          <a:prstGeom prst="straightConnector1">
+            <a:avLst/>
+          </a:prstGeom>
+          <a:ln w="19050">
+            <a:solidFill>
+              <a:srgbClr val="FF0000"/>
+            </a:solidFill>
+            <a:tailEnd type="triangle"/>
+          </a:ln>
+        </p:spPr>
+        <p:style>
+          <a:lnRef idx="1">
+            <a:schemeClr val="accent1"/>
+          </a:lnRef>
+          <a:fillRef idx="0">
+            <a:schemeClr val="accent1"/>
+          </a:fillRef>
+          <a:effectRef idx="0">
+            <a:schemeClr val="accent1"/>
+          </a:effectRef>
+          <a:fontRef idx="minor">
+            <a:schemeClr val="tx1"/>
+          </a:fontRef>
+        </p:style>
+      </p:cxnSp>
+      <p:cxnSp>
+        <p:nvCxnSpPr>
+          <p:cNvPr id="10" name="Straight Arrow Connector 9"/>
+          <p:cNvCxnSpPr/>
+          <p:nvPr/>
+        </p:nvCxnSpPr>
+        <p:spPr>
+          <a:xfrm flipH="1" flipV="1">
+            <a:off x="952500" y="4638675"/>
+            <a:ext cx="629575" cy="274645"/>
+          </a:xfrm>
+          <a:prstGeom prst="straightConnector1">
+            <a:avLst/>
+          </a:prstGeom>
+          <a:ln w="19050">
+            <a:solidFill>
+              <a:srgbClr val="FF0000"/>
+            </a:solidFill>
+            <a:tailEnd type="triangle"/>
+          </a:ln>
+        </p:spPr>
+        <p:style>
+          <a:lnRef idx="1">
+            <a:schemeClr val="accent1"/>
+          </a:lnRef>
+          <a:fillRef idx="0">
+            <a:schemeClr val="accent1"/>
+          </a:fillRef>
+          <a:effectRef idx="0">
+            <a:schemeClr val="accent1"/>
+          </a:effectRef>
+          <a:fontRef idx="minor">
+            <a:schemeClr val="tx1"/>
+          </a:fontRef>
+        </p:style>
+      </p:cxnSp>
+      <p:sp>
+        <p:nvSpPr>
+          <p:cNvPr id="12" name="Rectangle 11"/>
+          <p:cNvSpPr/>
+          <p:nvPr/>
+        </p:nvSpPr>
+        <p:spPr>
+          <a:xfrm>
+            <a:off x="-159184" y="4300121"/>
+            <a:ext cx="1502209" cy="584775"/>
+          </a:xfrm>
+          <a:prstGeom prst="rect">
+            <a:avLst/>
+          </a:prstGeom>
+        </p:spPr>
+        <p:txBody>
+          <a:bodyPr wrap="square">
+            <a:spAutoFit/>
+          </a:bodyPr>
+          <a:lstStyle/>
+          <a:p>
+            <a:pPr algn="ctr"/>
+            <a:r>
+              <a:rPr lang="tr-TR" sz="1600" dirty="0" err="1" smtClean="0">
+                <a:solidFill>
+                  <a:srgbClr val="C00000"/>
+                </a:solidFill>
+                <a:cs typeface="Arial" panose="020B0604020202020204" pitchFamily="34" charset="0"/>
+              </a:rPr>
+              <a:t>Sub-harmonic</a:t>
+            </a:r>
+            <a:endParaRPr lang="tr-TR" sz="1600" dirty="0" smtClean="0">
+              <a:solidFill>
+                <a:srgbClr val="C00000"/>
+              </a:solidFill>
+              <a:cs typeface="Arial" panose="020B0604020202020204" pitchFamily="34" charset="0"/>
+            </a:endParaRPr>
+          </a:p>
+          <a:p>
+            <a:pPr algn="ctr"/>
+            <a:r>
+              <a:rPr lang="tr-TR" sz="1600" dirty="0" smtClean="0">
+                <a:solidFill>
+                  <a:srgbClr val="C00000"/>
+                </a:solidFill>
+                <a:cs typeface="Arial" panose="020B0604020202020204" pitchFamily="34" charset="0"/>
+              </a:rPr>
+              <a:t>(2)</a:t>
+            </a:r>
+          </a:p>
+        </p:txBody>
+      </p:sp>
+      <p:sp>
+        <p:nvSpPr>
+          <p:cNvPr id="15" name="Rectangle 14"/>
+          <p:cNvSpPr/>
+          <p:nvPr/>
+        </p:nvSpPr>
+        <p:spPr>
+          <a:xfrm>
+            <a:off x="2260167" y="2685762"/>
+            <a:ext cx="444934" cy="338554"/>
+          </a:xfrm>
+          <a:prstGeom prst="rect">
+            <a:avLst/>
+          </a:prstGeom>
+        </p:spPr>
+        <p:txBody>
+          <a:bodyPr wrap="square">
+            <a:spAutoFit/>
+          </a:bodyPr>
+          <a:lstStyle/>
+          <a:p>
+            <a:pPr algn="ctr"/>
+            <a:r>
+              <a:rPr lang="tr-TR" sz="1600" dirty="0" smtClean="0">
+                <a:solidFill>
+                  <a:srgbClr val="C00000"/>
+                </a:solidFill>
+                <a:cs typeface="Arial" panose="020B0604020202020204" pitchFamily="34" charset="0"/>
+              </a:rPr>
+              <a:t>14</a:t>
+            </a:r>
+          </a:p>
+        </p:txBody>
+      </p:sp>
+    </p:spTree>
+    <p:extLst>
+      <p:ext uri="{BB962C8B-B14F-4D97-AF65-F5344CB8AC3E}">
+        <p14:creationId xmlns:p14="http://schemas.microsoft.com/office/powerpoint/2010/main" val="3903604165"/>
+      </p:ext>
+    </p:extLst>
+  </p:cSld>
+  <p:clrMapOvr>
+    <a:masterClrMapping/>
+  </p:clrMapOvr>
+  <p:timing>
+    <p:tnLst>
+      <p:par>
+        <p:cTn id="1" dur="indefinite" restart="never" nodeType="tmRoot"/>
+      </p:par>
+    </p:tnLst>
+  </p:timing>
+</p:sld>
+</file>
+
+<file path=ppt/slides/slide66.xml><?xml version="1.0" encoding="utf-8"?>
+<p:sld xmlns:a="http://schemas.openxmlformats.org/drawingml/2006/main" xmlns:r="http://schemas.openxmlformats.org/officeDocument/2006/relationships" xmlns:p="http://schemas.openxmlformats.org/presentationml/2006/main">
+  <p:cSld>
+    <p:spTree>
+      <p:nvGrpSpPr>
+        <p:cNvPr id="1" name=""/>
+        <p:cNvGrpSpPr/>
+        <p:nvPr/>
+      </p:nvGrpSpPr>
+      <p:grpSpPr>
+        <a:xfrm>
+          <a:off x="0" y="0"/>
+          <a:ext cx="0" cy="0"/>
+          <a:chOff x="0" y="0"/>
+          <a:chExt cx="0" cy="0"/>
+        </a:xfrm>
+      </p:grpSpPr>
+      <p:sp>
+        <p:nvSpPr>
+          <p:cNvPr id="8" name="Rectangle 7"/>
+          <p:cNvSpPr/>
+          <p:nvPr/>
+        </p:nvSpPr>
+        <p:spPr>
+          <a:xfrm>
+            <a:off x="478970" y="150669"/>
+            <a:ext cx="8207829" cy="523220"/>
+          </a:xfrm>
+          <a:prstGeom prst="rect">
+            <a:avLst/>
+          </a:prstGeom>
+        </p:spPr>
+        <p:txBody>
+          <a:bodyPr wrap="square">
+            <a:spAutoFit/>
+          </a:bodyPr>
+          <a:lstStyle/>
+          <a:p>
+            <a:pPr algn="ctr"/>
+            <a:r>
+              <a:rPr lang="tr-TR" sz="2800" b="1" dirty="0" err="1" smtClean="0">
+                <a:solidFill>
+                  <a:schemeClr val="accent1">
+                    <a:lumMod val="50000"/>
+                  </a:schemeClr>
+                </a:solidFill>
+                <a:cs typeface="Arial" panose="020B0604020202020204" pitchFamily="34" charset="0"/>
+              </a:rPr>
+              <a:t>Fractional</a:t>
+            </a:r>
+            <a:r>
+              <a:rPr lang="tr-TR" sz="2800" b="1" dirty="0" smtClean="0">
+                <a:solidFill>
+                  <a:schemeClr val="accent1">
+                    <a:lumMod val="50000"/>
+                  </a:schemeClr>
+                </a:solidFill>
+                <a:cs typeface="Arial" panose="020B0604020202020204" pitchFamily="34" charset="0"/>
+              </a:rPr>
+              <a:t> </a:t>
+            </a:r>
+            <a:r>
+              <a:rPr lang="tr-TR" sz="2800" b="1" dirty="0" err="1" smtClean="0">
+                <a:solidFill>
+                  <a:schemeClr val="accent1">
+                    <a:lumMod val="50000"/>
+                  </a:schemeClr>
+                </a:solidFill>
+                <a:cs typeface="Arial" panose="020B0604020202020204" pitchFamily="34" charset="0"/>
+              </a:rPr>
+              <a:t>Slot</a:t>
+            </a:r>
+            <a:r>
+              <a:rPr lang="tr-TR" sz="2800" b="1" dirty="0" smtClean="0">
+                <a:solidFill>
+                  <a:schemeClr val="accent1">
+                    <a:lumMod val="50000"/>
+                  </a:schemeClr>
+                </a:solidFill>
+                <a:cs typeface="Arial" panose="020B0604020202020204" pitchFamily="34" charset="0"/>
+              </a:rPr>
+              <a:t> </a:t>
+            </a:r>
+            <a:r>
+              <a:rPr lang="tr-TR" sz="2800" b="1" dirty="0" err="1" smtClean="0">
+                <a:solidFill>
+                  <a:schemeClr val="accent1">
+                    <a:lumMod val="50000"/>
+                  </a:schemeClr>
+                </a:solidFill>
+                <a:cs typeface="Arial" panose="020B0604020202020204" pitchFamily="34" charset="0"/>
+              </a:rPr>
+              <a:t>Concentrated</a:t>
+            </a:r>
+            <a:r>
+              <a:rPr lang="tr-TR" sz="2800" b="1" dirty="0" smtClean="0">
+                <a:solidFill>
+                  <a:schemeClr val="accent1">
+                    <a:lumMod val="50000"/>
+                  </a:schemeClr>
+                </a:solidFill>
+                <a:cs typeface="Arial" panose="020B0604020202020204" pitchFamily="34" charset="0"/>
+              </a:rPr>
+              <a:t> </a:t>
+            </a:r>
+            <a:r>
+              <a:rPr lang="tr-TR" sz="2800" b="1" dirty="0" err="1" smtClean="0">
+                <a:solidFill>
+                  <a:schemeClr val="accent1">
+                    <a:lumMod val="50000"/>
+                  </a:schemeClr>
+                </a:solidFill>
+                <a:cs typeface="Arial" panose="020B0604020202020204" pitchFamily="34" charset="0"/>
+              </a:rPr>
+              <a:t>Winding</a:t>
+            </a:r>
+            <a:r>
+              <a:rPr lang="tr-TR" sz="2800" b="1" dirty="0" smtClean="0">
+                <a:solidFill>
+                  <a:schemeClr val="accent1">
+                    <a:lumMod val="50000"/>
+                  </a:schemeClr>
+                </a:solidFill>
+                <a:cs typeface="Arial" panose="020B0604020202020204" pitchFamily="34" charset="0"/>
+              </a:rPr>
+              <a:t> </a:t>
+            </a:r>
+            <a:r>
+              <a:rPr lang="tr-TR" sz="2800" b="1" dirty="0" err="1" smtClean="0">
+                <a:solidFill>
+                  <a:schemeClr val="accent1">
+                    <a:lumMod val="50000"/>
+                  </a:schemeClr>
+                </a:solidFill>
+                <a:cs typeface="Arial" panose="020B0604020202020204" pitchFamily="34" charset="0"/>
+              </a:rPr>
+              <a:t>Machines</a:t>
+            </a:r>
+            <a:endParaRPr lang="en-US" sz="2800" dirty="0">
+              <a:solidFill>
+                <a:schemeClr val="accent1">
+                  <a:lumMod val="50000"/>
+                </a:schemeClr>
+              </a:solidFill>
+              <a:cs typeface="Arial" panose="020B0604020202020204" pitchFamily="34" charset="0"/>
+            </a:endParaRPr>
+          </a:p>
+        </p:txBody>
+      </p:sp>
+      <p:sp>
+        <p:nvSpPr>
+          <p:cNvPr id="6" name="Rectangle 5"/>
+          <p:cNvSpPr/>
+          <p:nvPr/>
+        </p:nvSpPr>
+        <p:spPr>
+          <a:xfrm>
+            <a:off x="333702" y="673889"/>
+            <a:ext cx="8744983" cy="400110"/>
+          </a:xfrm>
+          <a:prstGeom prst="rect">
+            <a:avLst/>
+          </a:prstGeom>
+        </p:spPr>
+        <p:txBody>
+          <a:bodyPr wrap="square">
+            <a:spAutoFit/>
+          </a:bodyPr>
+          <a:lstStyle/>
+          <a:p>
+            <a:pPr algn="ctr"/>
+            <a:r>
+              <a:rPr lang="tr-TR" sz="2000" b="1" dirty="0" smtClean="0">
+                <a:solidFill>
+                  <a:srgbClr val="002060"/>
+                </a:solidFill>
+                <a:cs typeface="Arial" panose="020B0604020202020204" pitchFamily="34" charset="0"/>
+              </a:rPr>
+              <a:t>MMF </a:t>
+            </a:r>
+            <a:r>
+              <a:rPr lang="tr-TR" sz="2000" b="1" dirty="0" err="1" smtClean="0">
+                <a:solidFill>
+                  <a:srgbClr val="002060"/>
+                </a:solidFill>
+                <a:cs typeface="Arial" panose="020B0604020202020204" pitchFamily="34" charset="0"/>
+              </a:rPr>
+              <a:t>distribution</a:t>
+            </a:r>
+            <a:r>
+              <a:rPr lang="tr-TR" sz="2000" b="1" dirty="0" smtClean="0">
+                <a:solidFill>
+                  <a:srgbClr val="002060"/>
+                </a:solidFill>
+                <a:cs typeface="Arial" panose="020B0604020202020204" pitchFamily="34" charset="0"/>
+              </a:rPr>
+              <a:t> – </a:t>
+            </a:r>
+            <a:r>
+              <a:rPr lang="tr-TR" sz="2000" b="1" dirty="0" err="1" smtClean="0">
+                <a:solidFill>
+                  <a:srgbClr val="002060"/>
+                </a:solidFill>
+                <a:cs typeface="Arial" panose="020B0604020202020204" pitchFamily="34" charset="0"/>
+              </a:rPr>
+              <a:t>Our</a:t>
+            </a:r>
+            <a:r>
+              <a:rPr lang="tr-TR" sz="2000" b="1" dirty="0" smtClean="0">
+                <a:solidFill>
+                  <a:srgbClr val="002060"/>
+                </a:solidFill>
+                <a:cs typeface="Arial" panose="020B0604020202020204" pitchFamily="34" charset="0"/>
+              </a:rPr>
+              <a:t> </a:t>
+            </a:r>
+            <a:r>
+              <a:rPr lang="tr-TR" sz="2000" b="1" dirty="0" err="1" smtClean="0">
+                <a:solidFill>
+                  <a:srgbClr val="002060"/>
+                </a:solidFill>
+                <a:cs typeface="Arial" panose="020B0604020202020204" pitchFamily="34" charset="0"/>
+              </a:rPr>
+              <a:t>machine</a:t>
+            </a:r>
+            <a:endParaRPr lang="tr-TR" sz="2000" b="1" dirty="0" smtClean="0">
+              <a:solidFill>
+                <a:srgbClr val="002060"/>
+              </a:solidFill>
+              <a:cs typeface="Arial" panose="020B0604020202020204" pitchFamily="34" charset="0"/>
+            </a:endParaRPr>
+          </a:p>
+        </p:txBody>
+      </p:sp>
+    </p:spTree>
+    <p:extLst>
+      <p:ext uri="{BB962C8B-B14F-4D97-AF65-F5344CB8AC3E}">
+        <p14:creationId xmlns:p14="http://schemas.microsoft.com/office/powerpoint/2010/main" val="1220374009"/>
       </p:ext>
     </p:extLst>
   </p:cSld>

</xml_diff>